<commit_message>
Minor fixes to documentation
</commit_message>
<xml_diff>
--- a/documentation/powerpoint/epidemic_broadcast.pptx
+++ b/documentation/powerpoint/epidemic_broadcast.pptx
@@ -308,7 +308,7 @@
           <a:p>
             <a:fld id="{A0D6426F-1996-4A5D-9565-BCE910AE69C7}" type="datetimeFigureOut">
               <a:rPr lang="it-IT" smtClean="0"/>
-              <a:t>10/04/2021</a:t>
+              <a:t>24/04/2021</a:t>
             </a:fld>
             <a:endParaRPr lang="it-IT"/>
           </a:p>
@@ -583,7 +583,7 @@
           <a:p>
             <a:fld id="{A0D6426F-1996-4A5D-9565-BCE910AE69C7}" type="datetimeFigureOut">
               <a:rPr lang="it-IT" smtClean="0"/>
-              <a:t>10/04/2021</a:t>
+              <a:t>24/04/2021</a:t>
             </a:fld>
             <a:endParaRPr lang="it-IT"/>
           </a:p>
@@ -777,7 +777,7 @@
           <a:p>
             <a:fld id="{A0D6426F-1996-4A5D-9565-BCE910AE69C7}" type="datetimeFigureOut">
               <a:rPr lang="it-IT" smtClean="0"/>
-              <a:t>10/04/2021</a:t>
+              <a:t>24/04/2021</a:t>
             </a:fld>
             <a:endParaRPr lang="it-IT"/>
           </a:p>
@@ -1050,7 +1050,7 @@
           <a:p>
             <a:fld id="{A0D6426F-1996-4A5D-9565-BCE910AE69C7}" type="datetimeFigureOut">
               <a:rPr lang="it-IT" smtClean="0"/>
-              <a:t>10/04/2021</a:t>
+              <a:t>24/04/2021</a:t>
             </a:fld>
             <a:endParaRPr lang="it-IT"/>
           </a:p>
@@ -1391,7 +1391,7 @@
           <a:p>
             <a:fld id="{A0D6426F-1996-4A5D-9565-BCE910AE69C7}" type="datetimeFigureOut">
               <a:rPr lang="it-IT" smtClean="0"/>
-              <a:t>10/04/2021</a:t>
+              <a:t>24/04/2021</a:t>
             </a:fld>
             <a:endParaRPr lang="it-IT"/>
           </a:p>
@@ -2014,7 +2014,7 @@
           <a:p>
             <a:fld id="{A0D6426F-1996-4A5D-9565-BCE910AE69C7}" type="datetimeFigureOut">
               <a:rPr lang="it-IT" smtClean="0"/>
-              <a:t>10/04/2021</a:t>
+              <a:t>24/04/2021</a:t>
             </a:fld>
             <a:endParaRPr lang="it-IT"/>
           </a:p>
@@ -2874,7 +2874,7 @@
           <a:p>
             <a:fld id="{A0D6426F-1996-4A5D-9565-BCE910AE69C7}" type="datetimeFigureOut">
               <a:rPr lang="it-IT" smtClean="0"/>
-              <a:t>10/04/2021</a:t>
+              <a:t>24/04/2021</a:t>
             </a:fld>
             <a:endParaRPr lang="it-IT"/>
           </a:p>
@@ -3044,7 +3044,7 @@
           <a:p>
             <a:fld id="{A0D6426F-1996-4A5D-9565-BCE910AE69C7}" type="datetimeFigureOut">
               <a:rPr lang="it-IT" smtClean="0"/>
-              <a:t>10/04/2021</a:t>
+              <a:t>24/04/2021</a:t>
             </a:fld>
             <a:endParaRPr lang="it-IT"/>
           </a:p>
@@ -3224,7 +3224,7 @@
           <a:p>
             <a:fld id="{A0D6426F-1996-4A5D-9565-BCE910AE69C7}" type="datetimeFigureOut">
               <a:rPr lang="it-IT" smtClean="0"/>
-              <a:t>10/04/2021</a:t>
+              <a:t>24/04/2021</a:t>
             </a:fld>
             <a:endParaRPr lang="it-IT"/>
           </a:p>
@@ -3394,7 +3394,7 @@
           <a:p>
             <a:fld id="{A0D6426F-1996-4A5D-9565-BCE910AE69C7}" type="datetimeFigureOut">
               <a:rPr lang="it-IT" smtClean="0"/>
-              <a:t>10/04/2021</a:t>
+              <a:t>24/04/2021</a:t>
             </a:fld>
             <a:endParaRPr lang="it-IT"/>
           </a:p>
@@ -3641,7 +3641,7 @@
           <a:p>
             <a:fld id="{A0D6426F-1996-4A5D-9565-BCE910AE69C7}" type="datetimeFigureOut">
               <a:rPr lang="it-IT" smtClean="0"/>
-              <a:t>10/04/2021</a:t>
+              <a:t>24/04/2021</a:t>
             </a:fld>
             <a:endParaRPr lang="it-IT"/>
           </a:p>
@@ -3933,7 +3933,7 @@
           <a:p>
             <a:fld id="{A0D6426F-1996-4A5D-9565-BCE910AE69C7}" type="datetimeFigureOut">
               <a:rPr lang="it-IT" smtClean="0"/>
-              <a:t>10/04/2021</a:t>
+              <a:t>24/04/2021</a:t>
             </a:fld>
             <a:endParaRPr lang="it-IT"/>
           </a:p>
@@ -4377,7 +4377,7 @@
           <a:p>
             <a:fld id="{A0D6426F-1996-4A5D-9565-BCE910AE69C7}" type="datetimeFigureOut">
               <a:rPr lang="it-IT" smtClean="0"/>
-              <a:t>10/04/2021</a:t>
+              <a:t>24/04/2021</a:t>
             </a:fld>
             <a:endParaRPr lang="it-IT"/>
           </a:p>
@@ -4495,7 +4495,7 @@
           <a:p>
             <a:fld id="{A0D6426F-1996-4A5D-9565-BCE910AE69C7}" type="datetimeFigureOut">
               <a:rPr lang="it-IT" smtClean="0"/>
-              <a:t>10/04/2021</a:t>
+              <a:t>24/04/2021</a:t>
             </a:fld>
             <a:endParaRPr lang="it-IT"/>
           </a:p>
@@ -4590,7 +4590,7 @@
           <a:p>
             <a:fld id="{A0D6426F-1996-4A5D-9565-BCE910AE69C7}" type="datetimeFigureOut">
               <a:rPr lang="it-IT" smtClean="0"/>
-              <a:t>10/04/2021</a:t>
+              <a:t>24/04/2021</a:t>
             </a:fld>
             <a:endParaRPr lang="it-IT"/>
           </a:p>
@@ -4869,7 +4869,7 @@
           <a:p>
             <a:fld id="{A0D6426F-1996-4A5D-9565-BCE910AE69C7}" type="datetimeFigureOut">
               <a:rPr lang="it-IT" smtClean="0"/>
-              <a:t>10/04/2021</a:t>
+              <a:t>24/04/2021</a:t>
             </a:fld>
             <a:endParaRPr lang="it-IT"/>
           </a:p>
@@ -5144,7 +5144,7 @@
           <a:p>
             <a:fld id="{A0D6426F-1996-4A5D-9565-BCE910AE69C7}" type="datetimeFigureOut">
               <a:rPr lang="it-IT" smtClean="0"/>
-              <a:t>10/04/2021</a:t>
+              <a:t>24/04/2021</a:t>
             </a:fld>
             <a:endParaRPr lang="it-IT"/>
           </a:p>
@@ -5573,7 +5573,7 @@
           <a:p>
             <a:fld id="{A0D6426F-1996-4A5D-9565-BCE910AE69C7}" type="datetimeFigureOut">
               <a:rPr lang="it-IT" smtClean="0"/>
-              <a:t>10/04/2021</a:t>
+              <a:t>24/04/2021</a:t>
             </a:fld>
             <a:endParaRPr lang="it-IT"/>
           </a:p>
@@ -6129,6 +6129,7 @@
           </a:bodyPr>
           <a:lstStyle/>
           <a:p>
+            <a:pPr algn="ctr"/>
             <a:r>
               <a:rPr lang="it-IT" sz="6600" dirty="0" err="1"/>
               <a:t>Epidemic</a:t>
@@ -6501,10 +6502,10 @@
       </p:grpSpPr>
       <p:sp>
         <p:nvSpPr>
-          <p:cNvPr id="2" name="Titolo 1">
+          <p:cNvPr id="5" name="title">
             <a:extLst>
               <a:ext uri="{FF2B5EF4-FFF2-40B4-BE49-F238E27FC236}">
-                <a16:creationId xmlns:a16="http://schemas.microsoft.com/office/drawing/2014/main" id="{AEFE9C74-A770-44A9-921F-7D48F577FDC1}"/>
+                <a16:creationId xmlns:a16="http://schemas.microsoft.com/office/drawing/2014/main" id="{8172F737-9A1D-4569-8D87-C0437F83E646}"/>
               </a:ext>
             </a:extLst>
           </p:cNvPr>
@@ -6517,27 +6518,80 @@
         </p:nvSpPr>
         <p:spPr>
           <a:xfrm>
-            <a:off x="806195" y="804672"/>
-            <a:ext cx="3521359" cy="5248656"/>
+            <a:off x="2425000" y="228706"/>
+            <a:ext cx="7192650" cy="761789"/>
           </a:xfrm>
         </p:spPr>
         <p:txBody>
-          <a:bodyPr anchor="ctr">
+          <a:bodyPr>
             <a:normAutofit/>
           </a:bodyPr>
           <a:lstStyle/>
           <a:p>
             <a:pPr algn="ctr"/>
             <a:r>
-              <a:rPr lang="it-IT"/>
-              <a:t>Presentation of the scenario (add image)</a:t>
-            </a:r>
-          </a:p>
-        </p:txBody>
-      </p:sp>
-      <p:sp>
-        <p:nvSpPr>
-          <p:cNvPr id="3" name="Segnaposto contenuto 2">
+              <a:rPr lang="it-IT" dirty="0"/>
+              <a:t>General scenario</a:t>
+            </a:r>
+          </a:p>
+        </p:txBody>
+      </p:sp>
+      <p:sp>
+        <p:nvSpPr>
+          <p:cNvPr id="41" name="Rectangle 32">
+            <a:extLst>
+              <a:ext uri="{FF2B5EF4-FFF2-40B4-BE49-F238E27FC236}">
+                <a16:creationId xmlns:a16="http://schemas.microsoft.com/office/drawing/2014/main" id="{AA047838-7F9E-43CF-A116-26E7AAA8F842}"/>
+              </a:ext>
+              <a:ext uri="{C183D7F6-B498-43B3-948B-1728B52AA6E4}">
+                <adec:decorative xmlns:adec="http://schemas.microsoft.com/office/drawing/2017/decorative" val="1"/>
+              </a:ext>
+            </a:extLst>
+          </p:cNvPr>
+          <p:cNvSpPr>
+            <a:spLocks noGrp="1" noRot="1" noChangeAspect="1" noMove="1" noResize="1" noEditPoints="1" noAdjustHandles="1" noChangeArrowheads="1" noChangeShapeType="1" noTextEdit="1"/>
+          </p:cNvSpPr>
+          <p:nvPr>
+            <p:extLst>
+              <p:ext uri="{386F3935-93C4-4BCD-93E2-E3B085C9AB24}">
+                <p16:designElem xmlns:p16="http://schemas.microsoft.com/office/powerpoint/2015/main" val="1"/>
+              </p:ext>
+            </p:extLst>
+          </p:nvPr>
+        </p:nvSpPr>
+        <p:spPr>
+          <a:xfrm>
+            <a:off x="10442448" y="0"/>
+            <a:ext cx="685800" cy="1143000"/>
+          </a:xfrm>
+          <a:prstGeom prst="rect">
+            <a:avLst/>
+          </a:prstGeom>
+          <a:solidFill>
+            <a:schemeClr val="accent1"/>
+          </a:solidFill>
+          <a:ln>
+            <a:noFill/>
+          </a:ln>
+        </p:spPr>
+        <p:style>
+          <a:lnRef idx="1">
+            <a:schemeClr val="accent1"/>
+          </a:lnRef>
+          <a:fillRef idx="3">
+            <a:schemeClr val="accent1"/>
+          </a:fillRef>
+          <a:effectRef idx="2">
+            <a:schemeClr val="accent1"/>
+          </a:effectRef>
+          <a:fontRef idx="minor">
+            <a:schemeClr val="lt1"/>
+          </a:fontRef>
+        </p:style>
+      </p:sp>
+      <p:sp>
+        <p:nvSpPr>
+          <p:cNvPr id="3" name="content">
             <a:extLst>
               <a:ext uri="{FF2B5EF4-FFF2-40B4-BE49-F238E27FC236}">
                 <a16:creationId xmlns:a16="http://schemas.microsoft.com/office/drawing/2014/main" id="{78D5FF5D-F902-4457-B541-B90A4196FD9B}"/>
@@ -6553,18 +6607,23 @@
         </p:nvSpPr>
         <p:spPr>
           <a:xfrm>
-            <a:off x="4975861" y="804671"/>
-            <a:ext cx="6399930" cy="5248657"/>
+            <a:off x="914401" y="1391055"/>
+            <a:ext cx="10213848" cy="4857344"/>
           </a:xfrm>
         </p:spPr>
         <p:txBody>
-          <a:bodyPr anchor="ctr">
+          <a:bodyPr>
             <a:normAutofit/>
           </a:bodyPr>
           <a:lstStyle/>
           <a:p>
-            <a:r>
-              <a:rPr lang="it-IT">
+            <a:pPr>
+              <a:lnSpc>
+                <a:spcPct val="150000"/>
+              </a:lnSpc>
+            </a:pPr>
+            <a:r>
+              <a:rPr lang="it-IT" dirty="0">
                 <a:effectLst>
                   <a:glow rad="38100">
                     <a:schemeClr val="bg1">
@@ -6583,7 +6642,7 @@
               <a:t>N users </a:t>
             </a:r>
             <a:r>
-              <a:rPr lang="it-IT" err="1">
+              <a:rPr lang="it-IT" dirty="0" err="1">
                 <a:effectLst>
                   <a:glow rad="38100">
                     <a:schemeClr val="bg1">
@@ -6602,7 +6661,7 @@
               <a:t>dropped</a:t>
             </a:r>
             <a:r>
-              <a:rPr lang="it-IT">
+              <a:rPr lang="it-IT" dirty="0">
                 <a:effectLst>
                   <a:glow rad="38100">
                     <a:schemeClr val="bg1">
@@ -6621,7 +6680,7 @@
               <a:t> </a:t>
             </a:r>
             <a:r>
-              <a:rPr lang="it-IT" err="1">
+              <a:rPr lang="it-IT" dirty="0" err="1">
                 <a:effectLst>
                   <a:glow rad="38100">
                     <a:schemeClr val="bg1">
@@ -6640,7 +6699,7 @@
               <a:t>randomly</a:t>
             </a:r>
             <a:r>
-              <a:rPr lang="it-IT">
+              <a:rPr lang="it-IT" dirty="0">
                 <a:effectLst>
                   <a:glow rad="38100">
                     <a:schemeClr val="bg1">
@@ -6659,7 +6718,7 @@
               <a:t> on a </a:t>
             </a:r>
             <a:r>
-              <a:rPr lang="it-IT" err="1">
+              <a:rPr lang="it-IT" dirty="0" err="1">
                 <a:effectLst>
                   <a:glow rad="38100">
                     <a:schemeClr val="bg1">
@@ -6677,7 +6736,7 @@
               </a:rPr>
               <a:t>floorplan</a:t>
             </a:r>
-            <a:endParaRPr lang="it-IT">
+            <a:endParaRPr lang="it-IT" dirty="0">
               <a:effectLst>
                 <a:glow rad="38100">
                   <a:schemeClr val="bg1">
@@ -6695,8 +6754,13 @@
             </a:endParaRPr>
           </a:p>
           <a:p>
-            <a:r>
-              <a:rPr lang="it-IT">
+            <a:pPr>
+              <a:lnSpc>
+                <a:spcPct val="150000"/>
+              </a:lnSpc>
+            </a:pPr>
+            <a:r>
+              <a:rPr lang="it-IT" dirty="0">
                 <a:effectLst>
                   <a:glow rad="38100">
                     <a:schemeClr val="bg1">
@@ -6715,7 +6779,7 @@
               <a:t>One of </a:t>
             </a:r>
             <a:r>
-              <a:rPr lang="it-IT" err="1">
+              <a:rPr lang="it-IT" dirty="0" err="1">
                 <a:effectLst>
                   <a:glow rad="38100">
                     <a:schemeClr val="bg1">
@@ -6734,7 +6798,7 @@
               <a:t>them</a:t>
             </a:r>
             <a:r>
-              <a:rPr lang="it-IT">
+              <a:rPr lang="it-IT" dirty="0">
                 <a:effectLst>
                   <a:glow rad="38100">
                     <a:schemeClr val="bg1">
@@ -6753,7 +6817,7 @@
               <a:t> </a:t>
             </a:r>
             <a:r>
-              <a:rPr lang="it-IT" err="1">
+              <a:rPr lang="it-IT" dirty="0" err="1">
                 <a:effectLst>
                   <a:glow rad="38100">
                     <a:schemeClr val="bg1">
@@ -6772,7 +6836,7 @@
               <a:t>produces</a:t>
             </a:r>
             <a:r>
-              <a:rPr lang="it-IT">
+              <a:rPr lang="it-IT" dirty="0">
                 <a:effectLst>
                   <a:glow rad="38100">
                     <a:schemeClr val="bg1">
@@ -6791,7 +6855,7 @@
               <a:t> a </a:t>
             </a:r>
             <a:r>
-              <a:rPr lang="it-IT" err="1">
+              <a:rPr lang="it-IT" dirty="0" err="1">
                 <a:effectLst>
                   <a:glow rad="38100">
                     <a:schemeClr val="bg1">
@@ -6810,7 +6874,7 @@
               <a:t>message</a:t>
             </a:r>
             <a:r>
-              <a:rPr lang="it-IT">
+              <a:rPr lang="it-IT" dirty="0">
                 <a:effectLst>
                   <a:glow rad="38100">
                     <a:schemeClr val="bg1">
@@ -6829,7 +6893,7 @@
               <a:t>, </a:t>
             </a:r>
             <a:r>
-              <a:rPr lang="it-IT" err="1">
+              <a:rPr lang="it-IT" dirty="0" err="1">
                 <a:effectLst>
                   <a:glow rad="38100">
                     <a:schemeClr val="bg1">
@@ -6848,7 +6912,7 @@
               <a:t>which</a:t>
             </a:r>
             <a:r>
-              <a:rPr lang="it-IT">
+              <a:rPr lang="it-IT" dirty="0">
                 <a:effectLst>
                   <a:glow rad="38100">
                     <a:schemeClr val="bg1">
@@ -6867,7 +6931,7 @@
               <a:t> </a:t>
             </a:r>
             <a:r>
-              <a:rPr lang="it-IT" err="1">
+              <a:rPr lang="it-IT" dirty="0" err="1">
                 <a:effectLst>
                   <a:glow rad="38100">
                     <a:schemeClr val="bg1">
@@ -6886,7 +6950,7 @@
               <a:t>should</a:t>
             </a:r>
             <a:r>
-              <a:rPr lang="it-IT">
+              <a:rPr lang="it-IT" dirty="0">
                 <a:effectLst>
                   <a:glow rad="38100">
                     <a:schemeClr val="bg1">
@@ -6905,7 +6969,7 @@
               <a:t> </a:t>
             </a:r>
             <a:r>
-              <a:rPr lang="it-IT" err="1">
+              <a:rPr lang="it-IT" dirty="0" err="1">
                 <a:effectLst>
                   <a:glow rad="38100">
                     <a:schemeClr val="bg1">
@@ -6924,7 +6988,7 @@
               <a:t>reach</a:t>
             </a:r>
             <a:r>
-              <a:rPr lang="it-IT">
+              <a:rPr lang="it-IT" dirty="0">
                 <a:effectLst>
                   <a:glow rad="38100">
                     <a:schemeClr val="bg1">
@@ -6943,7 +7007,7 @@
               <a:t> </a:t>
             </a:r>
             <a:r>
-              <a:rPr lang="it-IT" err="1">
+              <a:rPr lang="it-IT" dirty="0" err="1">
                 <a:effectLst>
                   <a:glow rad="38100">
                     <a:schemeClr val="bg1">
@@ -6962,7 +7026,7 @@
               <a:t>everyone</a:t>
             </a:r>
             <a:r>
-              <a:rPr lang="it-IT">
+              <a:rPr lang="it-IT" dirty="0">
                 <a:effectLst>
                   <a:glow rad="38100">
                     <a:schemeClr val="bg1">
@@ -6978,12 +7042,166 @@
                   </a:outerShdw>
                 </a:effectLst>
               </a:rPr>
-              <a:t> ASAP</a:t>
-            </a:r>
-          </a:p>
-          <a:p>
-            <a:r>
-              <a:rPr lang="it-IT">
+              <a:t> </a:t>
+            </a:r>
+            <a:r>
+              <a:rPr lang="it-IT" dirty="0" err="1">
+                <a:effectLst>
+                  <a:glow rad="38100">
+                    <a:schemeClr val="bg1">
+                      <a:lumMod val="50000"/>
+                      <a:lumOff val="50000"/>
+                      <a:alpha val="20000"/>
+                    </a:schemeClr>
+                  </a:glow>
+                  <a:outerShdw blurRad="38100" dist="38100" dir="2700000" algn="tl">
+                    <a:srgbClr val="000000">
+                      <a:alpha val="43137"/>
+                    </a:srgbClr>
+                  </a:outerShdw>
+                </a:effectLst>
+              </a:rPr>
+              <a:t>as</a:t>
+            </a:r>
+            <a:r>
+              <a:rPr lang="it-IT" dirty="0">
+                <a:effectLst>
+                  <a:glow rad="38100">
+                    <a:schemeClr val="bg1">
+                      <a:lumMod val="50000"/>
+                      <a:lumOff val="50000"/>
+                      <a:alpha val="20000"/>
+                    </a:schemeClr>
+                  </a:glow>
+                  <a:outerShdw blurRad="38100" dist="38100" dir="2700000" algn="tl">
+                    <a:srgbClr val="000000">
+                      <a:alpha val="43137"/>
+                    </a:srgbClr>
+                  </a:outerShdw>
+                </a:effectLst>
+              </a:rPr>
+              <a:t> </a:t>
+            </a:r>
+            <a:r>
+              <a:rPr lang="it-IT" dirty="0" err="1">
+                <a:effectLst>
+                  <a:glow rad="38100">
+                    <a:schemeClr val="bg1">
+                      <a:lumMod val="50000"/>
+                      <a:lumOff val="50000"/>
+                      <a:alpha val="20000"/>
+                    </a:schemeClr>
+                  </a:glow>
+                  <a:outerShdw blurRad="38100" dist="38100" dir="2700000" algn="tl">
+                    <a:srgbClr val="000000">
+                      <a:alpha val="43137"/>
+                    </a:srgbClr>
+                  </a:outerShdw>
+                </a:effectLst>
+              </a:rPr>
+              <a:t>soon</a:t>
+            </a:r>
+            <a:r>
+              <a:rPr lang="it-IT" dirty="0">
+                <a:effectLst>
+                  <a:glow rad="38100">
+                    <a:schemeClr val="bg1">
+                      <a:lumMod val="50000"/>
+                      <a:lumOff val="50000"/>
+                      <a:alpha val="20000"/>
+                    </a:schemeClr>
+                  </a:glow>
+                  <a:outerShdw blurRad="38100" dist="38100" dir="2700000" algn="tl">
+                    <a:srgbClr val="000000">
+                      <a:alpha val="43137"/>
+                    </a:srgbClr>
+                  </a:outerShdw>
+                </a:effectLst>
+              </a:rPr>
+              <a:t> </a:t>
+            </a:r>
+            <a:r>
+              <a:rPr lang="it-IT" dirty="0" err="1">
+                <a:effectLst>
+                  <a:glow rad="38100">
+                    <a:schemeClr val="bg1">
+                      <a:lumMod val="50000"/>
+                      <a:lumOff val="50000"/>
+                      <a:alpha val="20000"/>
+                    </a:schemeClr>
+                  </a:glow>
+                  <a:outerShdw blurRad="38100" dist="38100" dir="2700000" algn="tl">
+                    <a:srgbClr val="000000">
+                      <a:alpha val="43137"/>
+                    </a:srgbClr>
+                  </a:outerShdw>
+                </a:effectLst>
+              </a:rPr>
+              <a:t>as</a:t>
+            </a:r>
+            <a:r>
+              <a:rPr lang="it-IT" dirty="0">
+                <a:effectLst>
+                  <a:glow rad="38100">
+                    <a:schemeClr val="bg1">
+                      <a:lumMod val="50000"/>
+                      <a:lumOff val="50000"/>
+                      <a:alpha val="20000"/>
+                    </a:schemeClr>
+                  </a:glow>
+                  <a:outerShdw blurRad="38100" dist="38100" dir="2700000" algn="tl">
+                    <a:srgbClr val="000000">
+                      <a:alpha val="43137"/>
+                    </a:srgbClr>
+                  </a:outerShdw>
+                </a:effectLst>
+              </a:rPr>
+              <a:t> </a:t>
+            </a:r>
+            <a:r>
+              <a:rPr lang="it-IT" dirty="0" err="1">
+                <a:effectLst>
+                  <a:glow rad="38100">
+                    <a:schemeClr val="bg1">
+                      <a:lumMod val="50000"/>
+                      <a:lumOff val="50000"/>
+                      <a:alpha val="20000"/>
+                    </a:schemeClr>
+                  </a:glow>
+                  <a:outerShdw blurRad="38100" dist="38100" dir="2700000" algn="tl">
+                    <a:srgbClr val="000000">
+                      <a:alpha val="43137"/>
+                    </a:srgbClr>
+                  </a:outerShdw>
+                </a:effectLst>
+              </a:rPr>
+              <a:t>possible</a:t>
+            </a:r>
+            <a:endParaRPr lang="it-IT" dirty="0">
+              <a:effectLst>
+                <a:glow rad="38100">
+                  <a:schemeClr val="bg1">
+                    <a:lumMod val="50000"/>
+                    <a:lumOff val="50000"/>
+                    <a:alpha val="20000"/>
+                  </a:schemeClr>
+                </a:glow>
+                <a:outerShdw blurRad="38100" dist="38100" dir="2700000" algn="tl">
+                  <a:srgbClr val="000000">
+                    <a:alpha val="43137"/>
+                  </a:srgbClr>
+                </a:outerShdw>
+              </a:effectLst>
+            </a:endParaRPr>
+          </a:p>
+          <a:p>
+            <a:pPr>
+              <a:lnSpc>
+                <a:spcPct val="150000"/>
+              </a:lnSpc>
+            </a:pPr>
+            <a:r>
+              <a:rPr lang="it-IT" dirty="0">
                 <a:effectLst>
                   <a:glow rad="38100">
                     <a:schemeClr val="bg1">
@@ -7002,7 +7220,7 @@
               <a:t>Communications are </a:t>
             </a:r>
             <a:r>
-              <a:rPr lang="it-IT" i="1" err="1">
+              <a:rPr lang="it-IT" i="1" dirty="0" err="1">
                 <a:effectLst>
                   <a:glow rad="38100">
                     <a:schemeClr val="bg1">
@@ -7020,7 +7238,7 @@
               </a:rPr>
               <a:t>slotted</a:t>
             </a:r>
-            <a:endParaRPr lang="it-IT">
+            <a:endParaRPr lang="it-IT" dirty="0">
               <a:effectLst>
                 <a:glow rad="38100">
                   <a:schemeClr val="bg1">
@@ -7038,8 +7256,13 @@
             </a:endParaRPr>
           </a:p>
           <a:p>
-            <a:r>
-              <a:rPr lang="it-IT" err="1">
+            <a:pPr>
+              <a:lnSpc>
+                <a:spcPct val="150000"/>
+              </a:lnSpc>
+            </a:pPr>
+            <a:r>
+              <a:rPr lang="it-IT" dirty="0" err="1">
                 <a:effectLst>
                   <a:glow rad="38100">
                     <a:schemeClr val="bg1">
@@ -7058,7 +7281,7 @@
               <a:t>Every</a:t>
             </a:r>
             <a:r>
-              <a:rPr lang="it-IT">
+              <a:rPr lang="it-IT" dirty="0">
                 <a:effectLst>
                   <a:glow rad="38100">
                     <a:schemeClr val="bg1">
@@ -7077,7 +7300,7 @@
               <a:t> user </a:t>
             </a:r>
             <a:r>
-              <a:rPr lang="it-IT" err="1">
+              <a:rPr lang="it-IT" dirty="0" err="1">
                 <a:effectLst>
                   <a:glow rad="38100">
                     <a:schemeClr val="bg1">
@@ -7096,7 +7319,7 @@
               <a:t>has</a:t>
             </a:r>
             <a:r>
-              <a:rPr lang="it-IT">
+              <a:rPr lang="it-IT" dirty="0">
                 <a:effectLst>
                   <a:glow rad="38100">
                     <a:schemeClr val="bg1">
@@ -7115,7 +7338,7 @@
               <a:t> a </a:t>
             </a:r>
             <a:r>
-              <a:rPr lang="it-IT" b="1">
+              <a:rPr lang="it-IT" b="1" dirty="0">
                 <a:effectLst>
                   <a:glow rad="38100">
                     <a:schemeClr val="bg1">
@@ -7134,7 +7357,7 @@
               <a:t>transmission </a:t>
             </a:r>
             <a:r>
-              <a:rPr lang="it-IT" b="1" err="1">
+              <a:rPr lang="it-IT" b="1" dirty="0" err="1">
                 <a:effectLst>
                   <a:glow rad="38100">
                     <a:schemeClr val="bg1">
@@ -7153,7 +7376,7 @@
               <a:t>radius</a:t>
             </a:r>
             <a:r>
-              <a:rPr lang="it-IT" b="1">
+              <a:rPr lang="it-IT" b="1" dirty="0">
                 <a:effectLst>
                   <a:glow rad="38100">
                     <a:schemeClr val="bg1">
@@ -7172,7 +7395,7 @@
               <a:t> </a:t>
             </a:r>
             <a:r>
-              <a:rPr lang="it-IT" b="1" i="1">
+              <a:rPr lang="it-IT" b="1" i="1" dirty="0">
                 <a:effectLst>
                   <a:glow rad="38100">
                     <a:schemeClr val="bg1">
@@ -7192,8 +7415,13 @@
             </a:r>
           </a:p>
           <a:p>
-            <a:r>
-              <a:rPr lang="it-IT">
+            <a:pPr>
+              <a:lnSpc>
+                <a:spcPct val="150000"/>
+              </a:lnSpc>
+            </a:pPr>
+            <a:r>
+              <a:rPr lang="it-IT" dirty="0" err="1">
                 <a:effectLst>
                   <a:glow rad="38100">
                     <a:schemeClr val="bg1">
@@ -7209,10 +7437,10 @@
                   </a:outerShdw>
                 </a:effectLst>
               </a:rPr>
-              <a:t>Users </a:t>
-            </a:r>
-            <a:r>
-              <a:rPr lang="it-IT" err="1">
+              <a:t>Each</a:t>
+            </a:r>
+            <a:r>
+              <a:rPr lang="it-IT" dirty="0">
                 <a:effectLst>
                   <a:glow rad="38100">
                     <a:schemeClr val="bg1">
@@ -7228,10 +7456,29 @@
                   </a:outerShdw>
                 </a:effectLst>
               </a:rPr>
-              <a:t>relay</a:t>
-            </a:r>
-            <a:r>
-              <a:rPr lang="it-IT">
+              <a:t> user </a:t>
+            </a:r>
+            <a:r>
+              <a:rPr lang="it-IT" dirty="0" err="1">
+                <a:effectLst>
+                  <a:glow rad="38100">
+                    <a:schemeClr val="bg1">
+                      <a:lumMod val="50000"/>
+                      <a:lumOff val="50000"/>
+                      <a:alpha val="20000"/>
+                    </a:schemeClr>
+                  </a:glow>
+                  <a:outerShdw blurRad="38100" dist="38100" dir="2700000" algn="tl">
+                    <a:srgbClr val="000000">
+                      <a:alpha val="43137"/>
+                    </a:srgbClr>
+                  </a:outerShdw>
+                </a:effectLst>
+              </a:rPr>
+              <a:t>relays</a:t>
+            </a:r>
+            <a:r>
+              <a:rPr lang="it-IT" dirty="0">
                 <a:effectLst>
                   <a:glow rad="38100">
                     <a:schemeClr val="bg1">
@@ -7250,7 +7497,7 @@
               <a:t> the </a:t>
             </a:r>
             <a:r>
-              <a:rPr lang="it-IT" err="1">
+              <a:rPr lang="it-IT" dirty="0" err="1">
                 <a:effectLst>
                   <a:glow rad="38100">
                     <a:schemeClr val="bg1">
@@ -7269,7 +7516,7 @@
               <a:t>message</a:t>
             </a:r>
             <a:r>
-              <a:rPr lang="it-IT">
+              <a:rPr lang="it-IT" dirty="0">
                 <a:effectLst>
                   <a:glow rad="38100">
                     <a:schemeClr val="bg1">
@@ -7288,7 +7535,7 @@
               <a:t> </a:t>
             </a:r>
             <a:r>
-              <a:rPr lang="it-IT" b="1">
+              <a:rPr lang="it-IT" b="1" dirty="0">
                 <a:effectLst>
                   <a:glow rad="38100">
                     <a:schemeClr val="bg1">
@@ -7307,7 +7554,7 @@
               <a:t>once </a:t>
             </a:r>
             <a:r>
-              <a:rPr lang="it-IT">
+              <a:rPr lang="it-IT" dirty="0">
                 <a:effectLst>
                   <a:glow rad="38100">
                     <a:schemeClr val="bg1">
@@ -7326,7 +7573,7 @@
               <a:t>with </a:t>
             </a:r>
             <a:r>
-              <a:rPr lang="it-IT" b="1" err="1">
+              <a:rPr lang="it-IT" b="1" dirty="0" err="1">
                 <a:effectLst>
                   <a:glow rad="38100">
                     <a:schemeClr val="bg1">
@@ -7345,7 +7592,7 @@
               <a:t>probability</a:t>
             </a:r>
             <a:r>
-              <a:rPr lang="it-IT" b="1">
+              <a:rPr lang="it-IT" b="1" dirty="0">
                 <a:effectLst>
                   <a:glow rad="38100">
                     <a:schemeClr val="bg1">
@@ -7364,7 +7611,7 @@
               <a:t> </a:t>
             </a:r>
             <a:r>
-              <a:rPr lang="it-IT" b="1" i="1">
+              <a:rPr lang="it-IT" b="1" i="1" dirty="0">
                 <a:effectLst>
                   <a:glow rad="38100">
                     <a:schemeClr val="bg1">
@@ -7383,7 +7630,7 @@
               <a:t>p</a:t>
             </a:r>
             <a:r>
-              <a:rPr lang="it-IT" i="1">
+              <a:rPr lang="it-IT" i="1" dirty="0">
                 <a:effectLst>
                   <a:glow rad="38100">
                     <a:schemeClr val="bg1">
@@ -7402,7 +7649,7 @@
               <a:t> </a:t>
             </a:r>
             <a:r>
-              <a:rPr lang="it-IT">
+              <a:rPr lang="it-IT" dirty="0">
                 <a:effectLst>
                   <a:glow rad="38100">
                     <a:schemeClr val="bg1">
@@ -7421,7 +7668,7 @@
               <a:t>and </a:t>
             </a:r>
             <a:r>
-              <a:rPr lang="it-IT" err="1">
+              <a:rPr lang="it-IT" dirty="0" err="1">
                 <a:effectLst>
                   <a:glow rad="38100">
                     <a:schemeClr val="bg1">
@@ -7439,7 +7686,7 @@
               </a:rPr>
               <a:t>stops</a:t>
             </a:r>
-            <a:endParaRPr lang="it-IT">
+            <a:endParaRPr lang="it-IT" dirty="0">
               <a:effectLst>
                 <a:glow rad="38100">
                   <a:schemeClr val="bg1">
@@ -7457,8 +7704,13 @@
             </a:endParaRPr>
           </a:p>
           <a:p>
-            <a:r>
-              <a:rPr lang="it-IT">
+            <a:pPr>
+              <a:lnSpc>
+                <a:spcPct val="150000"/>
+              </a:lnSpc>
+            </a:pPr>
+            <a:r>
+              <a:rPr lang="it-IT" dirty="0">
                 <a:effectLst>
                   <a:glow rad="38100">
                     <a:schemeClr val="bg1">
@@ -7477,7 +7729,7 @@
               <a:t>Two or more transmission to the </a:t>
             </a:r>
             <a:r>
-              <a:rPr lang="it-IT" err="1">
+              <a:rPr lang="it-IT" dirty="0" err="1">
                 <a:effectLst>
                   <a:glow rad="38100">
                     <a:schemeClr val="bg1">
@@ -7496,7 +7748,7 @@
               <a:t>same</a:t>
             </a:r>
             <a:r>
-              <a:rPr lang="it-IT">
+              <a:rPr lang="it-IT" dirty="0">
                 <a:effectLst>
                   <a:glow rad="38100">
                     <a:schemeClr val="bg1">
@@ -7515,7 +7767,7 @@
               <a:t> </a:t>
             </a:r>
             <a:r>
-              <a:rPr lang="it-IT" err="1">
+              <a:rPr lang="it-IT" dirty="0" err="1">
                 <a:effectLst>
                   <a:glow rad="38100">
                     <a:schemeClr val="bg1">
@@ -7534,7 +7786,7 @@
               <a:t>receiver</a:t>
             </a:r>
             <a:r>
-              <a:rPr lang="it-IT">
+              <a:rPr lang="it-IT" dirty="0">
                 <a:effectLst>
                   <a:glow rad="38100">
                     <a:schemeClr val="bg1">
@@ -7553,7 +7805,7 @@
               <a:t> </a:t>
             </a:r>
             <a:r>
-              <a:rPr lang="it-IT" err="1">
+              <a:rPr lang="it-IT" dirty="0" err="1">
                 <a:effectLst>
                   <a:glow rad="38100">
                     <a:schemeClr val="bg1">
@@ -7572,7 +7824,7 @@
               <a:t>during</a:t>
             </a:r>
             <a:r>
-              <a:rPr lang="it-IT">
+              <a:rPr lang="it-IT" dirty="0">
                 <a:effectLst>
                   <a:glow rad="38100">
                     <a:schemeClr val="bg1">
@@ -7591,7 +7843,7 @@
               <a:t> the </a:t>
             </a:r>
             <a:r>
-              <a:rPr lang="it-IT" err="1">
+              <a:rPr lang="it-IT" dirty="0" err="1">
                 <a:effectLst>
                   <a:glow rad="38100">
                     <a:schemeClr val="bg1">
@@ -7610,7 +7862,7 @@
               <a:t>same</a:t>
             </a:r>
             <a:r>
-              <a:rPr lang="it-IT">
+              <a:rPr lang="it-IT" dirty="0">
                 <a:effectLst>
                   <a:glow rad="38100">
                     <a:schemeClr val="bg1">
@@ -7629,7 +7881,7 @@
               <a:t> slot produce a </a:t>
             </a:r>
             <a:r>
-              <a:rPr lang="it-IT" b="1" err="1">
+              <a:rPr lang="it-IT" b="1" dirty="0" err="1">
                 <a:effectLst>
                   <a:glow rad="38100">
                     <a:schemeClr val="bg1">
@@ -7648,7 +7900,7 @@
               <a:t>collision</a:t>
             </a:r>
             <a:r>
-              <a:rPr lang="it-IT" b="1">
+              <a:rPr lang="it-IT" b="1" dirty="0">
                 <a:effectLst>
                   <a:glow rad="38100">
                     <a:schemeClr val="bg1">
@@ -7667,7 +7919,7 @@
               <a:t>	</a:t>
             </a:r>
             <a:r>
-              <a:rPr lang="it-IT">
+              <a:rPr lang="it-IT" dirty="0">
                 <a:effectLst>
                   <a:glow rad="38100">
                     <a:schemeClr val="bg1">
@@ -7686,7 +7938,7 @@
               <a:t>(</a:t>
             </a:r>
             <a:r>
-              <a:rPr lang="it-IT" err="1">
+              <a:rPr lang="it-IT" dirty="0" err="1">
                 <a:effectLst>
                   <a:glow rad="38100">
                     <a:schemeClr val="bg1">
@@ -7705,7 +7957,7 @@
               <a:t>receiver</a:t>
             </a:r>
             <a:r>
-              <a:rPr lang="it-IT">
+              <a:rPr lang="it-IT" dirty="0">
                 <a:effectLst>
                   <a:glow rad="38100">
                     <a:schemeClr val="bg1">
@@ -7724,7 +7976,7 @@
               <a:t> </a:t>
             </a:r>
             <a:r>
-              <a:rPr lang="it-IT" err="1">
+              <a:rPr lang="it-IT" dirty="0" err="1">
                 <a:effectLst>
                   <a:glow rad="38100">
                     <a:schemeClr val="bg1">
@@ -7743,7 +7995,7 @@
               <a:t>will</a:t>
             </a:r>
             <a:r>
-              <a:rPr lang="it-IT">
+              <a:rPr lang="it-IT" dirty="0">
                 <a:effectLst>
                   <a:glow rad="38100">
                     <a:schemeClr val="bg1">
@@ -7762,7 +8014,7 @@
               <a:t> </a:t>
             </a:r>
             <a:r>
-              <a:rPr lang="it-IT" err="1">
+              <a:rPr lang="it-IT" dirty="0" err="1">
                 <a:effectLst>
                   <a:glow rad="38100">
                     <a:schemeClr val="bg1">
@@ -7781,7 +8033,7 @@
               <a:t>not</a:t>
             </a:r>
             <a:r>
-              <a:rPr lang="it-IT">
+              <a:rPr lang="it-IT" dirty="0">
                 <a:effectLst>
                   <a:glow rad="38100">
                     <a:schemeClr val="bg1">
@@ -7800,7 +8052,7 @@
               <a:t> be </a:t>
             </a:r>
             <a:r>
-              <a:rPr lang="it-IT" err="1">
+              <a:rPr lang="it-IT" dirty="0" err="1">
                 <a:effectLst>
                   <a:glow rad="38100">
                     <a:schemeClr val="bg1">
@@ -7819,7 +8071,7 @@
               <a:t>able</a:t>
             </a:r>
             <a:r>
-              <a:rPr lang="it-IT">
+              <a:rPr lang="it-IT" dirty="0">
                 <a:effectLst>
                   <a:glow rad="38100">
                     <a:schemeClr val="bg1">
@@ -7838,7 +8090,7 @@
               <a:t> to </a:t>
             </a:r>
             <a:r>
-              <a:rPr lang="it-IT" err="1">
+              <a:rPr lang="it-IT" dirty="0" err="1">
                 <a:effectLst>
                   <a:glow rad="38100">
                     <a:schemeClr val="bg1">
@@ -7857,7 +8109,7 @@
               <a:t>decode</a:t>
             </a:r>
             <a:r>
-              <a:rPr lang="it-IT">
+              <a:rPr lang="it-IT" dirty="0">
                 <a:effectLst>
                   <a:glow rad="38100">
                     <a:schemeClr val="bg1">
@@ -7876,7 +8128,7 @@
               <a:t> the </a:t>
             </a:r>
             <a:r>
-              <a:rPr lang="it-IT" err="1">
+              <a:rPr lang="it-IT" dirty="0" err="1">
                 <a:effectLst>
                   <a:glow rad="38100">
                     <a:schemeClr val="bg1">
@@ -7895,7 +8147,7 @@
               <a:t>message</a:t>
             </a:r>
             <a:r>
-              <a:rPr lang="it-IT">
+              <a:rPr lang="it-IT" dirty="0">
                 <a:effectLst>
                   <a:glow rad="38100">
                     <a:schemeClr val="bg1">
@@ -7914,7 +8166,7 @@
               <a:t> </a:t>
             </a:r>
             <a:r>
-              <a:rPr lang="it-IT" err="1">
+              <a:rPr lang="it-IT" dirty="0" err="1">
                 <a:effectLst>
                   <a:glow rad="38100">
                     <a:schemeClr val="bg1">
@@ -7933,7 +8185,7 @@
               <a:t>correctly</a:t>
             </a:r>
             <a:r>
-              <a:rPr lang="it-IT">
+              <a:rPr lang="it-IT" dirty="0">
                 <a:effectLst>
                   <a:glow rad="38100">
                     <a:schemeClr val="bg1">
@@ -7951,7 +8203,7 @@
               </a:rPr>
               <a:t>)</a:t>
             </a:r>
-            <a:endParaRPr lang="it-IT" b="1">
+            <a:endParaRPr lang="it-IT" b="1" dirty="0">
               <a:effectLst>
                 <a:glow rad="38100">
                   <a:schemeClr val="bg1">
@@ -7970,6 +8222,48 @@
           </a:p>
         </p:txBody>
       </p:sp>
+      <p:pic>
+        <p:nvPicPr>
+          <p:cNvPr id="7" name="floorplan_omnet" hidden="1">
+            <a:extLst>
+              <a:ext uri="{FF2B5EF4-FFF2-40B4-BE49-F238E27FC236}">
+                <a16:creationId xmlns:a16="http://schemas.microsoft.com/office/drawing/2014/main" id="{6AB34DBE-161C-4719-9187-929E0C655B05}"/>
+              </a:ext>
+            </a:extLst>
+          </p:cNvPr>
+          <p:cNvPicPr>
+            <a:picLocks noChangeAspect="1"/>
+          </p:cNvPicPr>
+          <p:nvPr/>
+        </p:nvPicPr>
+        <p:blipFill rotWithShape="1">
+          <a:blip r:embed="rId3">
+            <a:extLst>
+              <a:ext uri="{28A0092B-C50C-407E-A947-70E740481C1C}">
+                <a14:useLocalDpi xmlns:a14="http://schemas.microsoft.com/office/drawing/2010/main" val="0"/>
+              </a:ext>
+            </a:extLst>
+          </a:blip>
+          <a:srcRect l="135" r="682"/>
+          <a:stretch/>
+        </p:blipFill>
+        <p:spPr>
+          <a:xfrm>
+            <a:off x="5894962" y="609601"/>
+            <a:ext cx="5933872" cy="5638797"/>
+          </a:xfrm>
+          <a:prstGeom prst="rect">
+            <a:avLst/>
+          </a:prstGeom>
+          <a:effectLst>
+            <a:outerShdw blurRad="50800" dist="38100" dir="5400000" algn="t" rotWithShape="0">
+              <a:prstClr val="black">
+                <a:alpha val="43000"/>
+              </a:prstClr>
+            </a:outerShdw>
+          </a:effectLst>
+        </p:spPr>
+      </p:pic>
     </p:spTree>
     <p:extLst>
       <p:ext uri="{BB962C8B-B14F-4D97-AF65-F5344CB8AC3E}">
@@ -7980,6 +8274,496 @@
   <p:clrMapOvr>
     <a:masterClrMapping/>
   </p:clrMapOvr>
+  <p:timing>
+    <p:tnLst>
+      <p:par>
+        <p:cTn id="1" dur="indefinite" restart="never" nodeType="tmRoot">
+          <p:childTnLst>
+            <p:seq concurrent="1" nextAc="seek">
+              <p:cTn id="2" dur="indefinite" nodeType="mainSeq">
+                <p:childTnLst>
+                  <p:par>
+                    <p:cTn id="3" fill="hold">
+                      <p:stCondLst>
+                        <p:cond delay="indefinite"/>
+                      </p:stCondLst>
+                      <p:childTnLst>
+                        <p:par>
+                          <p:cTn id="4" fill="hold">
+                            <p:stCondLst>
+                              <p:cond delay="0"/>
+                            </p:stCondLst>
+                            <p:childTnLst>
+                              <p:par>
+                                <p:cTn id="5" presetID="10" presetClass="entr" presetSubtype="0" fill="hold" grpId="0" nodeType="clickEffect">
+                                  <p:stCondLst>
+                                    <p:cond delay="0"/>
+                                  </p:stCondLst>
+                                  <p:childTnLst>
+                                    <p:set>
+                                      <p:cBhvr>
+                                        <p:cTn id="6" dur="1" fill="hold">
+                                          <p:stCondLst>
+                                            <p:cond delay="0"/>
+                                          </p:stCondLst>
+                                        </p:cTn>
+                                        <p:tgtEl>
+                                          <p:spTgt spid="3">
+                                            <p:txEl>
+                                              <p:pRg st="0" end="0"/>
+                                            </p:txEl>
+                                          </p:spTgt>
+                                        </p:tgtEl>
+                                        <p:attrNameLst>
+                                          <p:attrName>style.visibility</p:attrName>
+                                        </p:attrNameLst>
+                                      </p:cBhvr>
+                                      <p:to>
+                                        <p:strVal val="visible"/>
+                                      </p:to>
+                                    </p:set>
+                                    <p:animEffect transition="in" filter="fade">
+                                      <p:cBhvr>
+                                        <p:cTn id="7" dur="500"/>
+                                        <p:tgtEl>
+                                          <p:spTgt spid="3">
+                                            <p:txEl>
+                                              <p:pRg st="0" end="0"/>
+                                            </p:txEl>
+                                          </p:spTgt>
+                                        </p:tgtEl>
+                                      </p:cBhvr>
+                                    </p:animEffect>
+                                  </p:childTnLst>
+                                </p:cTn>
+                              </p:par>
+                            </p:childTnLst>
+                          </p:cTn>
+                        </p:par>
+                      </p:childTnLst>
+                    </p:cTn>
+                  </p:par>
+                  <p:par>
+                    <p:cTn id="8" fill="hold">
+                      <p:stCondLst>
+                        <p:cond delay="indefinite"/>
+                      </p:stCondLst>
+                      <p:childTnLst>
+                        <p:par>
+                          <p:cTn id="9" fill="hold">
+                            <p:stCondLst>
+                              <p:cond delay="0"/>
+                            </p:stCondLst>
+                            <p:childTnLst>
+                              <p:par>
+                                <p:cTn id="10" presetID="10" presetClass="entr" presetSubtype="0" fill="hold" grpId="0" nodeType="clickEffect">
+                                  <p:stCondLst>
+                                    <p:cond delay="0"/>
+                                  </p:stCondLst>
+                                  <p:childTnLst>
+                                    <p:set>
+                                      <p:cBhvr>
+                                        <p:cTn id="11" dur="1" fill="hold">
+                                          <p:stCondLst>
+                                            <p:cond delay="0"/>
+                                          </p:stCondLst>
+                                        </p:cTn>
+                                        <p:tgtEl>
+                                          <p:spTgt spid="3">
+                                            <p:txEl>
+                                              <p:pRg st="1" end="1"/>
+                                            </p:txEl>
+                                          </p:spTgt>
+                                        </p:tgtEl>
+                                        <p:attrNameLst>
+                                          <p:attrName>style.visibility</p:attrName>
+                                        </p:attrNameLst>
+                                      </p:cBhvr>
+                                      <p:to>
+                                        <p:strVal val="visible"/>
+                                      </p:to>
+                                    </p:set>
+                                    <p:animEffect transition="in" filter="fade">
+                                      <p:cBhvr>
+                                        <p:cTn id="12" dur="500"/>
+                                        <p:tgtEl>
+                                          <p:spTgt spid="3">
+                                            <p:txEl>
+                                              <p:pRg st="1" end="1"/>
+                                            </p:txEl>
+                                          </p:spTgt>
+                                        </p:tgtEl>
+                                      </p:cBhvr>
+                                    </p:animEffect>
+                                  </p:childTnLst>
+                                </p:cTn>
+                              </p:par>
+                            </p:childTnLst>
+                          </p:cTn>
+                        </p:par>
+                      </p:childTnLst>
+                    </p:cTn>
+                  </p:par>
+                  <p:par>
+                    <p:cTn id="13" fill="hold">
+                      <p:stCondLst>
+                        <p:cond delay="indefinite"/>
+                      </p:stCondLst>
+                      <p:childTnLst>
+                        <p:par>
+                          <p:cTn id="14" fill="hold">
+                            <p:stCondLst>
+                              <p:cond delay="0"/>
+                            </p:stCondLst>
+                            <p:childTnLst>
+                              <p:par>
+                                <p:cTn id="15" presetID="10" presetClass="entr" presetSubtype="0" fill="hold" grpId="0" nodeType="clickEffect">
+                                  <p:stCondLst>
+                                    <p:cond delay="0"/>
+                                  </p:stCondLst>
+                                  <p:childTnLst>
+                                    <p:set>
+                                      <p:cBhvr>
+                                        <p:cTn id="16" dur="1" fill="hold">
+                                          <p:stCondLst>
+                                            <p:cond delay="0"/>
+                                          </p:stCondLst>
+                                        </p:cTn>
+                                        <p:tgtEl>
+                                          <p:spTgt spid="3">
+                                            <p:txEl>
+                                              <p:pRg st="2" end="2"/>
+                                            </p:txEl>
+                                          </p:spTgt>
+                                        </p:tgtEl>
+                                        <p:attrNameLst>
+                                          <p:attrName>style.visibility</p:attrName>
+                                        </p:attrNameLst>
+                                      </p:cBhvr>
+                                      <p:to>
+                                        <p:strVal val="visible"/>
+                                      </p:to>
+                                    </p:set>
+                                    <p:animEffect transition="in" filter="fade">
+                                      <p:cBhvr>
+                                        <p:cTn id="17" dur="500"/>
+                                        <p:tgtEl>
+                                          <p:spTgt spid="3">
+                                            <p:txEl>
+                                              <p:pRg st="2" end="2"/>
+                                            </p:txEl>
+                                          </p:spTgt>
+                                        </p:tgtEl>
+                                      </p:cBhvr>
+                                    </p:animEffect>
+                                  </p:childTnLst>
+                                </p:cTn>
+                              </p:par>
+                            </p:childTnLst>
+                          </p:cTn>
+                        </p:par>
+                      </p:childTnLst>
+                    </p:cTn>
+                  </p:par>
+                  <p:par>
+                    <p:cTn id="18" fill="hold">
+                      <p:stCondLst>
+                        <p:cond delay="indefinite"/>
+                      </p:stCondLst>
+                      <p:childTnLst>
+                        <p:par>
+                          <p:cTn id="19" fill="hold">
+                            <p:stCondLst>
+                              <p:cond delay="0"/>
+                            </p:stCondLst>
+                            <p:childTnLst>
+                              <p:par>
+                                <p:cTn id="20" presetID="10" presetClass="entr" presetSubtype="0" fill="hold" grpId="0" nodeType="clickEffect">
+                                  <p:stCondLst>
+                                    <p:cond delay="0"/>
+                                  </p:stCondLst>
+                                  <p:childTnLst>
+                                    <p:set>
+                                      <p:cBhvr>
+                                        <p:cTn id="21" dur="1" fill="hold">
+                                          <p:stCondLst>
+                                            <p:cond delay="0"/>
+                                          </p:stCondLst>
+                                        </p:cTn>
+                                        <p:tgtEl>
+                                          <p:spTgt spid="3">
+                                            <p:txEl>
+                                              <p:pRg st="3" end="3"/>
+                                            </p:txEl>
+                                          </p:spTgt>
+                                        </p:tgtEl>
+                                        <p:attrNameLst>
+                                          <p:attrName>style.visibility</p:attrName>
+                                        </p:attrNameLst>
+                                      </p:cBhvr>
+                                      <p:to>
+                                        <p:strVal val="visible"/>
+                                      </p:to>
+                                    </p:set>
+                                    <p:animEffect transition="in" filter="fade">
+                                      <p:cBhvr>
+                                        <p:cTn id="22" dur="500"/>
+                                        <p:tgtEl>
+                                          <p:spTgt spid="3">
+                                            <p:txEl>
+                                              <p:pRg st="3" end="3"/>
+                                            </p:txEl>
+                                          </p:spTgt>
+                                        </p:tgtEl>
+                                      </p:cBhvr>
+                                    </p:animEffect>
+                                  </p:childTnLst>
+                                </p:cTn>
+                              </p:par>
+                            </p:childTnLst>
+                          </p:cTn>
+                        </p:par>
+                      </p:childTnLst>
+                    </p:cTn>
+                  </p:par>
+                  <p:par>
+                    <p:cTn id="23" fill="hold">
+                      <p:stCondLst>
+                        <p:cond delay="indefinite"/>
+                      </p:stCondLst>
+                      <p:childTnLst>
+                        <p:par>
+                          <p:cTn id="24" fill="hold">
+                            <p:stCondLst>
+                              <p:cond delay="0"/>
+                            </p:stCondLst>
+                            <p:childTnLst>
+                              <p:par>
+                                <p:cTn id="25" presetID="10" presetClass="entr" presetSubtype="0" fill="hold" grpId="0" nodeType="clickEffect">
+                                  <p:stCondLst>
+                                    <p:cond delay="0"/>
+                                  </p:stCondLst>
+                                  <p:childTnLst>
+                                    <p:set>
+                                      <p:cBhvr>
+                                        <p:cTn id="26" dur="1" fill="hold">
+                                          <p:stCondLst>
+                                            <p:cond delay="0"/>
+                                          </p:stCondLst>
+                                        </p:cTn>
+                                        <p:tgtEl>
+                                          <p:spTgt spid="3">
+                                            <p:txEl>
+                                              <p:pRg st="4" end="4"/>
+                                            </p:txEl>
+                                          </p:spTgt>
+                                        </p:tgtEl>
+                                        <p:attrNameLst>
+                                          <p:attrName>style.visibility</p:attrName>
+                                        </p:attrNameLst>
+                                      </p:cBhvr>
+                                      <p:to>
+                                        <p:strVal val="visible"/>
+                                      </p:to>
+                                    </p:set>
+                                    <p:animEffect transition="in" filter="fade">
+                                      <p:cBhvr>
+                                        <p:cTn id="27" dur="500"/>
+                                        <p:tgtEl>
+                                          <p:spTgt spid="3">
+                                            <p:txEl>
+                                              <p:pRg st="4" end="4"/>
+                                            </p:txEl>
+                                          </p:spTgt>
+                                        </p:tgtEl>
+                                      </p:cBhvr>
+                                    </p:animEffect>
+                                  </p:childTnLst>
+                                </p:cTn>
+                              </p:par>
+                            </p:childTnLst>
+                          </p:cTn>
+                        </p:par>
+                      </p:childTnLst>
+                    </p:cTn>
+                  </p:par>
+                  <p:par>
+                    <p:cTn id="28" fill="hold">
+                      <p:stCondLst>
+                        <p:cond delay="indefinite"/>
+                      </p:stCondLst>
+                      <p:childTnLst>
+                        <p:par>
+                          <p:cTn id="29" fill="hold">
+                            <p:stCondLst>
+                              <p:cond delay="0"/>
+                            </p:stCondLst>
+                            <p:childTnLst>
+                              <p:par>
+                                <p:cTn id="30" presetID="10" presetClass="entr" presetSubtype="0" fill="hold" grpId="0" nodeType="clickEffect">
+                                  <p:stCondLst>
+                                    <p:cond delay="0"/>
+                                  </p:stCondLst>
+                                  <p:childTnLst>
+                                    <p:set>
+                                      <p:cBhvr>
+                                        <p:cTn id="31" dur="1" fill="hold">
+                                          <p:stCondLst>
+                                            <p:cond delay="0"/>
+                                          </p:stCondLst>
+                                        </p:cTn>
+                                        <p:tgtEl>
+                                          <p:spTgt spid="3">
+                                            <p:txEl>
+                                              <p:pRg st="5" end="5"/>
+                                            </p:txEl>
+                                          </p:spTgt>
+                                        </p:tgtEl>
+                                        <p:attrNameLst>
+                                          <p:attrName>style.visibility</p:attrName>
+                                        </p:attrNameLst>
+                                      </p:cBhvr>
+                                      <p:to>
+                                        <p:strVal val="visible"/>
+                                      </p:to>
+                                    </p:set>
+                                    <p:animEffect transition="in" filter="fade">
+                                      <p:cBhvr>
+                                        <p:cTn id="32" dur="500"/>
+                                        <p:tgtEl>
+                                          <p:spTgt spid="3">
+                                            <p:txEl>
+                                              <p:pRg st="5" end="5"/>
+                                            </p:txEl>
+                                          </p:spTgt>
+                                        </p:tgtEl>
+                                      </p:cBhvr>
+                                    </p:animEffect>
+                                  </p:childTnLst>
+                                </p:cTn>
+                              </p:par>
+                            </p:childTnLst>
+                          </p:cTn>
+                        </p:par>
+                      </p:childTnLst>
+                    </p:cTn>
+                  </p:par>
+                  <p:par>
+                    <p:cTn id="33" fill="hold">
+                      <p:stCondLst>
+                        <p:cond delay="indefinite"/>
+                      </p:stCondLst>
+                      <p:childTnLst>
+                        <p:par>
+                          <p:cTn id="34" fill="hold">
+                            <p:stCondLst>
+                              <p:cond delay="0"/>
+                            </p:stCondLst>
+                            <p:childTnLst>
+                              <p:par>
+                                <p:cTn id="35" presetID="2" presetClass="entr" presetSubtype="2" fill="hold" nodeType="clickEffect">
+                                  <p:stCondLst>
+                                    <p:cond delay="0"/>
+                                  </p:stCondLst>
+                                  <p:childTnLst>
+                                    <p:set>
+                                      <p:cBhvr>
+                                        <p:cTn id="36" dur="1" fill="hold">
+                                          <p:stCondLst>
+                                            <p:cond delay="0"/>
+                                          </p:stCondLst>
+                                        </p:cTn>
+                                        <p:tgtEl>
+                                          <p:spTgt spid="7"/>
+                                        </p:tgtEl>
+                                        <p:attrNameLst>
+                                          <p:attrName>style.visibility</p:attrName>
+                                        </p:attrNameLst>
+                                      </p:cBhvr>
+                                      <p:to>
+                                        <p:strVal val="visible"/>
+                                      </p:to>
+                                    </p:set>
+                                    <p:anim calcmode="lin" valueType="num">
+                                      <p:cBhvr additive="base">
+                                        <p:cTn id="37" dur="500" fill="hold"/>
+                                        <p:tgtEl>
+                                          <p:spTgt spid="7"/>
+                                        </p:tgtEl>
+                                        <p:attrNameLst>
+                                          <p:attrName>ppt_x</p:attrName>
+                                        </p:attrNameLst>
+                                      </p:cBhvr>
+                                      <p:tavLst>
+                                        <p:tav tm="0">
+                                          <p:val>
+                                            <p:strVal val="1+#ppt_w/2"/>
+                                          </p:val>
+                                        </p:tav>
+                                        <p:tav tm="100000">
+                                          <p:val>
+                                            <p:strVal val="#ppt_x"/>
+                                          </p:val>
+                                        </p:tav>
+                                      </p:tavLst>
+                                    </p:anim>
+                                    <p:anim calcmode="lin" valueType="num">
+                                      <p:cBhvr additive="base">
+                                        <p:cTn id="38" dur="500" fill="hold"/>
+                                        <p:tgtEl>
+                                          <p:spTgt spid="7"/>
+                                        </p:tgtEl>
+                                        <p:attrNameLst>
+                                          <p:attrName>ppt_y</p:attrName>
+                                        </p:attrNameLst>
+                                      </p:cBhvr>
+                                      <p:tavLst>
+                                        <p:tav tm="0">
+                                          <p:val>
+                                            <p:strVal val="#ppt_y"/>
+                                          </p:val>
+                                        </p:tav>
+                                        <p:tav tm="100000">
+                                          <p:val>
+                                            <p:strVal val="#ppt_y"/>
+                                          </p:val>
+                                        </p:tav>
+                                      </p:tavLst>
+                                    </p:anim>
+                                  </p:childTnLst>
+                                </p:cTn>
+                              </p:par>
+                            </p:childTnLst>
+                          </p:cTn>
+                        </p:par>
+                      </p:childTnLst>
+                    </p:cTn>
+                  </p:par>
+                </p:childTnLst>
+              </p:cTn>
+              <p:prevCondLst>
+                <p:cond evt="onPrev" delay="0">
+                  <p:tgtEl>
+                    <p:sldTgt/>
+                  </p:tgtEl>
+                </p:cond>
+              </p:prevCondLst>
+              <p:nextCondLst>
+                <p:cond evt="onNext" delay="0">
+                  <p:tgtEl>
+                    <p:sldTgt/>
+                  </p:tgtEl>
+                </p:cond>
+              </p:nextCondLst>
+            </p:seq>
+          </p:childTnLst>
+        </p:cTn>
+      </p:par>
+    </p:tnLst>
+    <p:bldLst>
+      <p:bldP spid="3" grpId="0" build="p"/>
+    </p:bldLst>
+  </p:timing>
 </p:sld>
 </file>
 
@@ -8018,7 +8802,7 @@
         </p:nvSpPr>
         <p:spPr>
           <a:xfrm>
-            <a:off x="1141413" y="609600"/>
+            <a:off x="1141413" y="328291"/>
             <a:ext cx="9905998" cy="776140"/>
           </a:xfrm>
         </p:spPr>
@@ -8031,7 +8815,7 @@
             <a:pPr algn="ctr"/>
             <a:r>
               <a:rPr lang="it-IT" dirty="0" err="1"/>
-              <a:t>overview</a:t>
+              <a:t>Overview</a:t>
             </a:r>
             <a:endParaRPr lang="it-IT" dirty="0"/>
           </a:p>
@@ -8055,7 +8839,7 @@
         </p:nvSpPr>
         <p:spPr>
           <a:xfrm>
-            <a:off x="1141413" y="1385740"/>
+            <a:off x="1141413" y="1492501"/>
             <a:ext cx="4954587" cy="433633"/>
           </a:xfrm>
         </p:spPr>
@@ -8069,475 +8853,9 @@
               <a:buNone/>
             </a:pPr>
             <a:r>
-              <a:rPr lang="it-IT" sz="3200" dirty="0" err="1"/>
-              <a:t>metrics</a:t>
-            </a:r>
-            <a:endParaRPr lang="it-IT" sz="3200" dirty="0"/>
-          </a:p>
-        </p:txBody>
-      </p:sp>
-      <p:sp>
-        <p:nvSpPr>
-          <p:cNvPr id="4" name="Segnaposto contenuto 2">
-            <a:extLst>
-              <a:ext uri="{FF2B5EF4-FFF2-40B4-BE49-F238E27FC236}">
-                <a16:creationId xmlns:a16="http://schemas.microsoft.com/office/drawing/2014/main" id="{81E3B383-40C8-4334-B118-4541C9ED73AA}"/>
-              </a:ext>
-            </a:extLst>
-          </p:cNvPr>
-          <p:cNvSpPr txBox="1">
-            <a:spLocks/>
-          </p:cNvSpPr>
-          <p:nvPr/>
-        </p:nvSpPr>
-        <p:spPr>
-          <a:xfrm>
-            <a:off x="6091236" y="1385740"/>
-            <a:ext cx="4954587" cy="433633"/>
-          </a:xfrm>
-          <a:prstGeom prst="rect">
-            <a:avLst/>
-          </a:prstGeom>
-        </p:spPr>
-        <p:txBody>
-          <a:bodyPr vert="horz" lIns="91440" tIns="45720" rIns="91440" bIns="45720" rtlCol="0" anchor="ctr">
-            <a:normAutofit fontScale="85000" lnSpcReduction="20000"/>
-          </a:bodyPr>
-          <a:lstStyle>
-            <a:lvl1pPr marL="285750" indent="-285750" algn="l" defTabSz="457200" rtl="0" eaLnBrk="1" latinLnBrk="0" hangingPunct="1">
-              <a:spcBef>
-                <a:spcPct val="20000"/>
-              </a:spcBef>
-              <a:spcAft>
-                <a:spcPts val="600"/>
-              </a:spcAft>
-              <a:buClr>
-                <a:schemeClr val="tx1"/>
-              </a:buClr>
-              <a:buSzPct val="100000"/>
-              <a:buFont typeface="Arial"/>
-              <a:buChar char="•"/>
-              <a:defRPr sz="2000" kern="1200" cap="small">
-                <a:gradFill flip="none" rotWithShape="1">
-                  <a:gsLst>
-                    <a:gs pos="0">
-                      <a:schemeClr val="tx1"/>
-                    </a:gs>
-                    <a:gs pos="100000">
-                      <a:schemeClr val="tx1">
-                        <a:lumMod val="75000"/>
-                      </a:schemeClr>
-                    </a:gs>
-                  </a:gsLst>
-                  <a:lin ang="5580000" scaled="0"/>
-                  <a:tileRect/>
-                </a:gradFill>
-                <a:effectLst>
-                  <a:glow rad="38100">
-                    <a:schemeClr val="bg1">
-                      <a:lumMod val="50000"/>
-                      <a:lumOff val="50000"/>
-                      <a:alpha val="20000"/>
-                    </a:schemeClr>
-                  </a:glow>
-                  <a:outerShdw blurRad="44450" dist="12700" dir="13860000" algn="tl" rotWithShape="0">
-                    <a:srgbClr val="000000">
-                      <a:alpha val="20000"/>
-                    </a:srgbClr>
-                  </a:outerShdw>
-                </a:effectLst>
-                <a:latin typeface="+mn-lt"/>
-                <a:ea typeface="+mn-ea"/>
-                <a:cs typeface="+mn-cs"/>
-              </a:defRPr>
-            </a:lvl1pPr>
-            <a:lvl2pPr marL="742950" indent="-285750" algn="l" defTabSz="457200" rtl="0" eaLnBrk="1" latinLnBrk="0" hangingPunct="1">
-              <a:spcBef>
-                <a:spcPct val="20000"/>
-              </a:spcBef>
-              <a:spcAft>
-                <a:spcPts val="600"/>
-              </a:spcAft>
-              <a:buClr>
-                <a:schemeClr val="tx1"/>
-              </a:buClr>
-              <a:buSzPct val="100000"/>
-              <a:buFont typeface="Arial"/>
-              <a:buChar char="•"/>
-              <a:defRPr sz="1800" kern="1200" cap="small">
-                <a:gradFill flip="none" rotWithShape="1">
-                  <a:gsLst>
-                    <a:gs pos="0">
-                      <a:schemeClr val="tx1"/>
-                    </a:gs>
-                    <a:gs pos="100000">
-                      <a:schemeClr val="tx1">
-                        <a:lumMod val="75000"/>
-                      </a:schemeClr>
-                    </a:gs>
-                  </a:gsLst>
-                  <a:lin ang="5580000" scaled="0"/>
-                  <a:tileRect/>
-                </a:gradFill>
-                <a:effectLst>
-                  <a:glow rad="38100">
-                    <a:schemeClr val="bg1">
-                      <a:lumMod val="50000"/>
-                      <a:lumOff val="50000"/>
-                      <a:alpha val="20000"/>
-                    </a:schemeClr>
-                  </a:glow>
-                  <a:outerShdw blurRad="44450" dist="12700" dir="13860000" algn="tl" rotWithShape="0">
-                    <a:srgbClr val="000000">
-                      <a:alpha val="20000"/>
-                    </a:srgbClr>
-                  </a:outerShdw>
-                </a:effectLst>
-                <a:latin typeface="+mn-lt"/>
-                <a:ea typeface="+mn-ea"/>
-                <a:cs typeface="+mn-cs"/>
-              </a:defRPr>
-            </a:lvl2pPr>
-            <a:lvl3pPr marL="1200150" indent="-285750" algn="l" defTabSz="457200" rtl="0" eaLnBrk="1" latinLnBrk="0" hangingPunct="1">
-              <a:spcBef>
-                <a:spcPct val="20000"/>
-              </a:spcBef>
-              <a:spcAft>
-                <a:spcPts val="600"/>
-              </a:spcAft>
-              <a:buClr>
-                <a:schemeClr val="tx1"/>
-              </a:buClr>
-              <a:buSzPct val="100000"/>
-              <a:buFont typeface="Arial"/>
-              <a:buChar char="•"/>
-              <a:defRPr sz="1600" kern="1200" cap="small">
-                <a:gradFill flip="none" rotWithShape="1">
-                  <a:gsLst>
-                    <a:gs pos="0">
-                      <a:schemeClr val="tx1"/>
-                    </a:gs>
-                    <a:gs pos="100000">
-                      <a:schemeClr val="tx1">
-                        <a:lumMod val="75000"/>
-                      </a:schemeClr>
-                    </a:gs>
-                  </a:gsLst>
-                  <a:lin ang="5580000" scaled="0"/>
-                  <a:tileRect/>
-                </a:gradFill>
-                <a:effectLst>
-                  <a:glow rad="38100">
-                    <a:schemeClr val="bg1">
-                      <a:lumMod val="50000"/>
-                      <a:lumOff val="50000"/>
-                      <a:alpha val="20000"/>
-                    </a:schemeClr>
-                  </a:glow>
-                  <a:outerShdw blurRad="44450" dist="12700" dir="13860000" algn="tl" rotWithShape="0">
-                    <a:srgbClr val="000000">
-                      <a:alpha val="20000"/>
-                    </a:srgbClr>
-                  </a:outerShdw>
-                </a:effectLst>
-                <a:latin typeface="+mn-lt"/>
-                <a:ea typeface="+mn-ea"/>
-                <a:cs typeface="+mn-cs"/>
-              </a:defRPr>
-            </a:lvl3pPr>
-            <a:lvl4pPr marL="1543050" indent="-171450" algn="l" defTabSz="457200" rtl="0" eaLnBrk="1" latinLnBrk="0" hangingPunct="1">
-              <a:spcBef>
-                <a:spcPct val="20000"/>
-              </a:spcBef>
-              <a:spcAft>
-                <a:spcPts val="600"/>
-              </a:spcAft>
-              <a:buClr>
-                <a:schemeClr val="tx1"/>
-              </a:buClr>
-              <a:buSzPct val="100000"/>
-              <a:buFont typeface="Arial"/>
-              <a:buChar char="•"/>
-              <a:defRPr sz="1400" kern="1200" cap="small">
-                <a:gradFill flip="none" rotWithShape="1">
-                  <a:gsLst>
-                    <a:gs pos="0">
-                      <a:schemeClr val="tx1"/>
-                    </a:gs>
-                    <a:gs pos="100000">
-                      <a:schemeClr val="tx1">
-                        <a:lumMod val="75000"/>
-                      </a:schemeClr>
-                    </a:gs>
-                  </a:gsLst>
-                  <a:lin ang="5580000" scaled="0"/>
-                  <a:tileRect/>
-                </a:gradFill>
-                <a:effectLst>
-                  <a:glow rad="38100">
-                    <a:schemeClr val="bg1">
-                      <a:lumMod val="50000"/>
-                      <a:lumOff val="50000"/>
-                      <a:alpha val="20000"/>
-                    </a:schemeClr>
-                  </a:glow>
-                  <a:outerShdw blurRad="44450" dist="12700" dir="13860000" algn="tl" rotWithShape="0">
-                    <a:srgbClr val="000000">
-                      <a:alpha val="20000"/>
-                    </a:srgbClr>
-                  </a:outerShdw>
-                </a:effectLst>
-                <a:latin typeface="+mn-lt"/>
-                <a:ea typeface="+mn-ea"/>
-                <a:cs typeface="+mn-cs"/>
-              </a:defRPr>
-            </a:lvl4pPr>
-            <a:lvl5pPr marL="2000250" indent="-171450" algn="l" defTabSz="457200" rtl="0" eaLnBrk="1" latinLnBrk="0" hangingPunct="1">
-              <a:spcBef>
-                <a:spcPct val="20000"/>
-              </a:spcBef>
-              <a:spcAft>
-                <a:spcPts val="600"/>
-              </a:spcAft>
-              <a:buClr>
-                <a:schemeClr val="tx1"/>
-              </a:buClr>
-              <a:buSzPct val="100000"/>
-              <a:buFont typeface="Arial"/>
-              <a:buChar char="•"/>
-              <a:defRPr sz="1400" kern="1200" cap="small">
-                <a:gradFill flip="none" rotWithShape="1">
-                  <a:gsLst>
-                    <a:gs pos="0">
-                      <a:schemeClr val="tx1"/>
-                    </a:gs>
-                    <a:gs pos="100000">
-                      <a:schemeClr val="tx1">
-                        <a:lumMod val="75000"/>
-                      </a:schemeClr>
-                    </a:gs>
-                  </a:gsLst>
-                  <a:lin ang="5580000" scaled="0"/>
-                  <a:tileRect/>
-                </a:gradFill>
-                <a:effectLst>
-                  <a:glow rad="38100">
-                    <a:schemeClr val="bg1">
-                      <a:lumMod val="50000"/>
-                      <a:lumOff val="50000"/>
-                      <a:alpha val="20000"/>
-                    </a:schemeClr>
-                  </a:glow>
-                  <a:outerShdw blurRad="44450" dist="12700" dir="13860000" algn="tl" rotWithShape="0">
-                    <a:srgbClr val="000000">
-                      <a:alpha val="20000"/>
-                    </a:srgbClr>
-                  </a:outerShdw>
-                </a:effectLst>
-                <a:latin typeface="+mn-lt"/>
-                <a:ea typeface="+mn-ea"/>
-                <a:cs typeface="+mn-cs"/>
-              </a:defRPr>
-            </a:lvl5pPr>
-            <a:lvl6pPr marL="2514600" indent="-228600" algn="l" defTabSz="457200" rtl="0" eaLnBrk="1" latinLnBrk="0" hangingPunct="1">
-              <a:spcBef>
-                <a:spcPct val="20000"/>
-              </a:spcBef>
-              <a:spcAft>
-                <a:spcPts val="600"/>
-              </a:spcAft>
-              <a:buClr>
-                <a:schemeClr val="tx1"/>
-              </a:buClr>
-              <a:buSzPct val="100000"/>
-              <a:buFont typeface="Arial"/>
-              <a:buChar char="•"/>
-              <a:defRPr sz="1200" kern="1200" cap="small">
-                <a:gradFill flip="none" rotWithShape="1">
-                  <a:gsLst>
-                    <a:gs pos="0">
-                      <a:schemeClr val="tx1"/>
-                    </a:gs>
-                    <a:gs pos="100000">
-                      <a:schemeClr val="tx1">
-                        <a:lumMod val="75000"/>
-                      </a:schemeClr>
-                    </a:gs>
-                  </a:gsLst>
-                  <a:lin ang="5580000" scaled="0"/>
-                  <a:tileRect/>
-                </a:gradFill>
-                <a:effectLst>
-                  <a:glow rad="38100">
-                    <a:schemeClr val="bg1">
-                      <a:lumMod val="50000"/>
-                      <a:lumOff val="50000"/>
-                      <a:alpha val="20000"/>
-                    </a:schemeClr>
-                  </a:glow>
-                  <a:outerShdw blurRad="44450" dist="12700" dir="13860000" algn="tl" rotWithShape="0">
-                    <a:srgbClr val="000000">
-                      <a:alpha val="20000"/>
-                    </a:srgbClr>
-                  </a:outerShdw>
-                </a:effectLst>
-                <a:latin typeface="+mn-lt"/>
-                <a:ea typeface="+mn-ea"/>
-                <a:cs typeface="+mn-cs"/>
-              </a:defRPr>
-            </a:lvl6pPr>
-            <a:lvl7pPr marL="2971800" indent="-228600" algn="l" defTabSz="457200" rtl="0" eaLnBrk="1" latinLnBrk="0" hangingPunct="1">
-              <a:spcBef>
-                <a:spcPct val="20000"/>
-              </a:spcBef>
-              <a:spcAft>
-                <a:spcPts val="600"/>
-              </a:spcAft>
-              <a:buClr>
-                <a:schemeClr val="tx1"/>
-              </a:buClr>
-              <a:buSzPct val="100000"/>
-              <a:buFont typeface="Arial"/>
-              <a:buChar char="•"/>
-              <a:defRPr sz="1200" kern="1200" cap="small">
-                <a:gradFill flip="none" rotWithShape="1">
-                  <a:gsLst>
-                    <a:gs pos="0">
-                      <a:schemeClr val="tx1"/>
-                    </a:gs>
-                    <a:gs pos="100000">
-                      <a:schemeClr val="tx1">
-                        <a:lumMod val="75000"/>
-                      </a:schemeClr>
-                    </a:gs>
-                  </a:gsLst>
-                  <a:lin ang="5580000" scaled="0"/>
-                  <a:tileRect/>
-                </a:gradFill>
-                <a:effectLst>
-                  <a:glow rad="38100">
-                    <a:schemeClr val="bg1">
-                      <a:lumMod val="50000"/>
-                      <a:lumOff val="50000"/>
-                      <a:alpha val="20000"/>
-                    </a:schemeClr>
-                  </a:glow>
-                  <a:outerShdw blurRad="44450" dist="12700" dir="13860000" algn="tl" rotWithShape="0">
-                    <a:srgbClr val="000000">
-                      <a:alpha val="20000"/>
-                    </a:srgbClr>
-                  </a:outerShdw>
-                </a:effectLst>
-                <a:latin typeface="+mn-lt"/>
-                <a:ea typeface="+mn-ea"/>
-                <a:cs typeface="+mn-cs"/>
-              </a:defRPr>
-            </a:lvl7pPr>
-            <a:lvl8pPr marL="3429000" indent="-228600" algn="l" defTabSz="457200" rtl="0" eaLnBrk="1" latinLnBrk="0" hangingPunct="1">
-              <a:spcBef>
-                <a:spcPct val="20000"/>
-              </a:spcBef>
-              <a:spcAft>
-                <a:spcPts val="600"/>
-              </a:spcAft>
-              <a:buClr>
-                <a:schemeClr val="tx1"/>
-              </a:buClr>
-              <a:buSzPct val="100000"/>
-              <a:buFont typeface="Arial"/>
-              <a:buChar char="•"/>
-              <a:defRPr sz="1200" kern="1200" cap="small">
-                <a:gradFill flip="none" rotWithShape="1">
-                  <a:gsLst>
-                    <a:gs pos="0">
-                      <a:schemeClr val="tx1"/>
-                    </a:gs>
-                    <a:gs pos="100000">
-                      <a:schemeClr val="tx1">
-                        <a:lumMod val="75000"/>
-                      </a:schemeClr>
-                    </a:gs>
-                  </a:gsLst>
-                  <a:lin ang="5580000" scaled="0"/>
-                  <a:tileRect/>
-                </a:gradFill>
-                <a:effectLst>
-                  <a:glow rad="38100">
-                    <a:schemeClr val="bg1">
-                      <a:lumMod val="50000"/>
-                      <a:lumOff val="50000"/>
-                      <a:alpha val="20000"/>
-                    </a:schemeClr>
-                  </a:glow>
-                  <a:outerShdw blurRad="44450" dist="12700" dir="13860000" algn="tl" rotWithShape="0">
-                    <a:srgbClr val="000000">
-                      <a:alpha val="20000"/>
-                    </a:srgbClr>
-                  </a:outerShdw>
-                </a:effectLst>
-                <a:latin typeface="+mn-lt"/>
-                <a:ea typeface="+mn-ea"/>
-                <a:cs typeface="+mn-cs"/>
-              </a:defRPr>
-            </a:lvl8pPr>
-            <a:lvl9pPr marL="3886200" indent="-228600" algn="l" defTabSz="457200" rtl="0" eaLnBrk="1" latinLnBrk="0" hangingPunct="1">
-              <a:spcBef>
-                <a:spcPct val="20000"/>
-              </a:spcBef>
-              <a:spcAft>
-                <a:spcPts val="600"/>
-              </a:spcAft>
-              <a:buClr>
-                <a:schemeClr val="tx1"/>
-              </a:buClr>
-              <a:buSzPct val="100000"/>
-              <a:buFont typeface="Arial"/>
-              <a:buChar char="•"/>
-              <a:defRPr sz="1200" kern="1200" cap="small">
-                <a:gradFill flip="none" rotWithShape="1">
-                  <a:gsLst>
-                    <a:gs pos="0">
-                      <a:schemeClr val="tx1"/>
-                    </a:gs>
-                    <a:gs pos="100000">
-                      <a:schemeClr val="tx1">
-                        <a:lumMod val="75000"/>
-                      </a:schemeClr>
-                    </a:gs>
-                  </a:gsLst>
-                  <a:lin ang="5580000" scaled="0"/>
-                  <a:tileRect/>
-                </a:gradFill>
-                <a:effectLst>
-                  <a:glow rad="38100">
-                    <a:schemeClr val="bg1">
-                      <a:lumMod val="50000"/>
-                      <a:lumOff val="50000"/>
-                      <a:alpha val="20000"/>
-                    </a:schemeClr>
-                  </a:glow>
-                  <a:outerShdw blurRad="44450" dist="12700" dir="13860000" algn="tl" rotWithShape="0">
-                    <a:srgbClr val="000000">
-                      <a:alpha val="20000"/>
-                    </a:srgbClr>
-                  </a:outerShdw>
-                </a:effectLst>
-                <a:latin typeface="+mn-lt"/>
-                <a:ea typeface="+mn-ea"/>
-                <a:cs typeface="+mn-cs"/>
-              </a:defRPr>
-            </a:lvl9pPr>
-          </a:lstStyle>
-          <a:p>
-            <a:pPr marL="0" indent="0" algn="ctr">
-              <a:buFont typeface="Arial"/>
-              <a:buNone/>
-            </a:pPr>
-            <a:r>
-              <a:rPr lang="it-IT" sz="3200" dirty="0" err="1"/>
-              <a:t>parameters</a:t>
-            </a:r>
-            <a:endParaRPr lang="it-IT" sz="3200" dirty="0"/>
+              <a:rPr lang="it-IT" sz="3200" dirty="0"/>
+              <a:t>METRICS</a:t>
+            </a:r>
           </a:p>
         </p:txBody>
       </p:sp>
@@ -8555,8 +8873,8 @@
         </p:nvSpPr>
         <p:spPr>
           <a:xfrm>
-            <a:off x="1234911" y="1819373"/>
-            <a:ext cx="4861089" cy="1841658"/>
+            <a:off x="1141413" y="2604939"/>
+            <a:ext cx="4861089" cy="2843754"/>
           </a:xfrm>
           <a:prstGeom prst="rect">
             <a:avLst/>
@@ -8565,7 +8883,7 @@
         </p:spPr>
         <p:txBody>
           <a:bodyPr wrap="square" rtlCol="0">
-            <a:spAutoFit/>
+            <a:noAutofit/>
           </a:bodyPr>
           <a:lstStyle/>
           <a:p>
@@ -8577,14 +8895,14 @@
               <a:buChar char="•"/>
             </a:pPr>
             <a:r>
-              <a:rPr lang="it-IT" sz="2000" dirty="0"/>
+              <a:rPr lang="it-IT" sz="2200" dirty="0"/>
               <a:t>Broadcast time  </a:t>
             </a:r>
             <a:r>
-              <a:rPr lang="it-IT" sz="2000" b="1" i="1" dirty="0"/>
+              <a:rPr lang="it-IT" sz="2200" b="1" i="1" dirty="0"/>
               <a:t>T</a:t>
             </a:r>
-            <a:endParaRPr lang="it-IT" sz="2000" dirty="0"/>
+            <a:endParaRPr lang="it-IT" sz="2200" dirty="0"/>
           </a:p>
           <a:p>
             <a:pPr marL="285750" indent="-285750">
@@ -8595,14 +8913,14 @@
               <a:buChar char="•"/>
             </a:pPr>
             <a:r>
-              <a:rPr lang="it-IT" sz="2000" dirty="0"/>
+              <a:rPr lang="it-IT" sz="2200" dirty="0"/>
               <a:t>Coverage </a:t>
             </a:r>
             <a:r>
-              <a:rPr lang="it-IT" sz="2000" b="1" i="1" dirty="0"/>
+              <a:rPr lang="it-IT" sz="2200" b="1" i="1" dirty="0"/>
               <a:t>C</a:t>
             </a:r>
-            <a:endParaRPr lang="it-IT" sz="2000" dirty="0"/>
+            <a:endParaRPr lang="it-IT" sz="2200" dirty="0"/>
           </a:p>
           <a:p>
             <a:pPr marL="285750" indent="-285750">
@@ -8613,26 +8931,26 @@
               <a:buChar char="•"/>
             </a:pPr>
             <a:r>
-              <a:rPr lang="it-IT" sz="2000" dirty="0" err="1"/>
+              <a:rPr lang="it-IT" sz="2200" dirty="0" err="1"/>
               <a:t>Number</a:t>
             </a:r>
             <a:r>
-              <a:rPr lang="it-IT" sz="2000" dirty="0"/>
+              <a:rPr lang="it-IT" sz="2200" dirty="0"/>
               <a:t> of </a:t>
             </a:r>
             <a:r>
-              <a:rPr lang="it-IT" sz="2000" dirty="0" err="1"/>
+              <a:rPr lang="it-IT" sz="2200" dirty="0" err="1"/>
               <a:t>collisions</a:t>
             </a:r>
             <a:r>
-              <a:rPr lang="it-IT" sz="2000" dirty="0"/>
+              <a:rPr lang="it-IT" sz="2200" dirty="0"/>
               <a:t> </a:t>
             </a:r>
             <a:r>
-              <a:rPr lang="it-IT" sz="2000" b="1" i="1" dirty="0"/>
+              <a:rPr lang="it-IT" sz="2200" b="1" i="1" dirty="0"/>
               <a:t>X</a:t>
             </a:r>
-            <a:endParaRPr lang="it-IT" sz="2000" dirty="0"/>
+            <a:endParaRPr lang="it-IT" sz="2200" dirty="0"/>
           </a:p>
         </p:txBody>
       </p:sp>
@@ -8650,8 +8968,8 @@
         </p:nvSpPr>
         <p:spPr>
           <a:xfrm>
-            <a:off x="6337134" y="1819373"/>
-            <a:ext cx="4861089" cy="1938992"/>
+            <a:off x="6002502" y="2240436"/>
+            <a:ext cx="5337943" cy="3572759"/>
           </a:xfrm>
           <a:prstGeom prst="rect">
             <a:avLst/>
@@ -8660,171 +8978,224 @@
         </p:spPr>
         <p:txBody>
           <a:bodyPr wrap="square" rtlCol="0">
-            <a:spAutoFit/>
+            <a:noAutofit/>
           </a:bodyPr>
           <a:lstStyle/>
           <a:p>
             <a:pPr marL="285750" indent="-285750">
+              <a:lnSpc>
+                <a:spcPct val="150000"/>
+              </a:lnSpc>
               <a:buFont typeface="Arial" panose="020B0604020202020204" pitchFamily="34" charset="0"/>
               <a:buChar char="•"/>
             </a:pPr>
             <a:r>
-              <a:rPr lang="it-IT" sz="2000" dirty="0"/>
+              <a:rPr lang="it-IT" sz="2200" dirty="0"/>
               <a:t>Broadcast </a:t>
             </a:r>
             <a:r>
-              <a:rPr lang="it-IT" sz="2000" dirty="0" err="1"/>
+              <a:rPr lang="it-IT" sz="2200" dirty="0" err="1"/>
               <a:t>radius</a:t>
             </a:r>
             <a:r>
-              <a:rPr lang="it-IT" sz="2000" dirty="0"/>
+              <a:rPr lang="it-IT" sz="2200" dirty="0"/>
               <a:t> </a:t>
             </a:r>
             <a:r>
-              <a:rPr lang="it-IT" sz="2000" b="1" i="1" dirty="0"/>
+              <a:rPr lang="it-IT" sz="2200" b="1" i="1" dirty="0"/>
               <a:t>R</a:t>
             </a:r>
           </a:p>
           <a:p>
             <a:pPr marL="285750" indent="-285750">
+              <a:lnSpc>
+                <a:spcPct val="150000"/>
+              </a:lnSpc>
               <a:buFont typeface="Arial" panose="020B0604020202020204" pitchFamily="34" charset="0"/>
               <a:buChar char="•"/>
             </a:pPr>
             <a:r>
-              <a:rPr lang="it-IT" sz="2000" dirty="0"/>
+              <a:rPr lang="it-IT" sz="2200" dirty="0"/>
               <a:t>Transmission </a:t>
             </a:r>
             <a:r>
-              <a:rPr lang="it-IT" sz="2000" dirty="0" err="1"/>
+              <a:rPr lang="it-IT" sz="2200" dirty="0" err="1"/>
               <a:t>probability</a:t>
             </a:r>
             <a:r>
-              <a:rPr lang="it-IT" sz="2000" dirty="0"/>
+              <a:rPr lang="it-IT" sz="2200" dirty="0"/>
               <a:t> </a:t>
             </a:r>
             <a:r>
-              <a:rPr lang="it-IT" sz="2000" b="1" i="1" dirty="0"/>
+              <a:rPr lang="it-IT" sz="2200" b="1" i="1" dirty="0"/>
               <a:t>p</a:t>
             </a:r>
           </a:p>
           <a:p>
             <a:pPr marL="285750" indent="-285750">
+              <a:lnSpc>
+                <a:spcPct val="150000"/>
+              </a:lnSpc>
               <a:buFont typeface="Arial" panose="020B0604020202020204" pitchFamily="34" charset="0"/>
               <a:buChar char="•"/>
             </a:pPr>
             <a:r>
-              <a:rPr lang="it-IT" sz="2000" dirty="0" err="1"/>
+              <a:rPr lang="it-IT" sz="2200" dirty="0" err="1"/>
               <a:t>Number</a:t>
             </a:r>
             <a:r>
-              <a:rPr lang="it-IT" sz="2000" dirty="0"/>
+              <a:rPr lang="it-IT" sz="2200" dirty="0"/>
               <a:t> of users </a:t>
             </a:r>
             <a:r>
-              <a:rPr lang="it-IT" sz="2000" b="1" i="1" dirty="0"/>
+              <a:rPr lang="it-IT" sz="2200" b="1" i="1" dirty="0"/>
               <a:t>N</a:t>
             </a:r>
-            <a:endParaRPr lang="it-IT" sz="2000" dirty="0"/>
+            <a:endParaRPr lang="it-IT" sz="2200" dirty="0"/>
           </a:p>
           <a:p>
             <a:pPr marL="285750" indent="-285750">
+              <a:lnSpc>
+                <a:spcPct val="150000"/>
+              </a:lnSpc>
               <a:buFont typeface="Arial" panose="020B0604020202020204" pitchFamily="34" charset="0"/>
               <a:buChar char="•"/>
             </a:pPr>
             <a:r>
-              <a:rPr lang="it-IT" sz="2000" dirty="0" err="1"/>
+              <a:rPr lang="it-IT" sz="2200" dirty="0" err="1"/>
               <a:t>Length</a:t>
             </a:r>
             <a:r>
-              <a:rPr lang="it-IT" sz="2000" dirty="0"/>
+              <a:rPr lang="it-IT" sz="2200" dirty="0"/>
               <a:t> of the side of the </a:t>
             </a:r>
             <a:r>
-              <a:rPr lang="it-IT" sz="2000" dirty="0" err="1"/>
+              <a:rPr lang="it-IT" sz="2200" dirty="0" err="1"/>
               <a:t>floorplan</a:t>
             </a:r>
             <a:r>
-              <a:rPr lang="it-IT" sz="2000" dirty="0"/>
+              <a:rPr lang="it-IT" sz="2200" dirty="0"/>
               <a:t> </a:t>
             </a:r>
             <a:r>
-              <a:rPr lang="it-IT" sz="2000" b="1" i="1" dirty="0"/>
+              <a:rPr lang="it-IT" sz="2200" b="1" i="1" dirty="0"/>
               <a:t>L</a:t>
             </a:r>
           </a:p>
           <a:p>
             <a:pPr marL="285750" indent="-285750">
+              <a:lnSpc>
+                <a:spcPct val="150000"/>
+              </a:lnSpc>
               <a:buFont typeface="Arial" panose="020B0604020202020204" pitchFamily="34" charset="0"/>
               <a:buChar char="•"/>
             </a:pPr>
             <a:r>
-              <a:rPr lang="it-IT" sz="2000" dirty="0"/>
+              <a:rPr lang="it-IT" sz="2200" dirty="0"/>
               <a:t>"</a:t>
             </a:r>
             <a:r>
-              <a:rPr lang="it-IT" sz="2000" dirty="0" err="1"/>
+              <a:rPr lang="it-IT" sz="2200" dirty="0" err="1"/>
               <a:t>Aspect</a:t>
             </a:r>
             <a:r>
-              <a:rPr lang="it-IT" sz="2000" dirty="0"/>
+              <a:rPr lang="it-IT" sz="2200" dirty="0"/>
               <a:t> ratio" of the </a:t>
             </a:r>
             <a:r>
-              <a:rPr lang="it-IT" sz="2000" dirty="0" err="1"/>
+              <a:rPr lang="it-IT" sz="2200" dirty="0" err="1"/>
               <a:t>floorplan</a:t>
             </a:r>
             <a:r>
-              <a:rPr lang="it-IT" sz="2000" dirty="0"/>
+              <a:rPr lang="it-IT" sz="2200" dirty="0"/>
               <a:t> </a:t>
             </a:r>
             <a:r>
-              <a:rPr lang="it-IT" sz="2000" b="1" i="1" dirty="0"/>
+              <a:rPr lang="it-IT" sz="2200" b="1" i="1" dirty="0"/>
               <a:t>a</a:t>
             </a:r>
           </a:p>
           <a:p>
             <a:pPr marL="285750" indent="-285750">
+              <a:lnSpc>
+                <a:spcPct val="150000"/>
+              </a:lnSpc>
               <a:buFont typeface="Arial" panose="020B0604020202020204" pitchFamily="34" charset="0"/>
               <a:buChar char="•"/>
             </a:pPr>
             <a:r>
-              <a:rPr lang="it-IT" sz="2000" dirty="0" err="1"/>
+              <a:rPr lang="it-IT" sz="2200" dirty="0" err="1"/>
               <a:t>Density</a:t>
             </a:r>
             <a:r>
-              <a:rPr lang="it-IT" sz="2000" dirty="0"/>
+              <a:rPr lang="it-IT" sz="2200" dirty="0"/>
               <a:t> of users per </a:t>
             </a:r>
             <a:r>
-              <a:rPr lang="it-IT" sz="2000" dirty="0" err="1"/>
+              <a:rPr lang="it-IT" sz="2200" dirty="0" err="1"/>
               <a:t>square</a:t>
             </a:r>
             <a:r>
-              <a:rPr lang="it-IT" sz="2000" dirty="0"/>
+              <a:rPr lang="it-IT" sz="2200" dirty="0"/>
               <a:t> </a:t>
             </a:r>
             <a:r>
-              <a:rPr lang="it-IT" sz="2000" dirty="0" err="1"/>
+              <a:rPr lang="it-IT" sz="2200" dirty="0" err="1"/>
               <a:t>metre</a:t>
             </a:r>
             <a:r>
-              <a:rPr lang="it-IT" sz="2000" dirty="0"/>
+              <a:rPr lang="it-IT" sz="2200" dirty="0"/>
               <a:t> </a:t>
             </a:r>
             <a:r>
-              <a:rPr lang="it-IT" sz="2000" b="1" i="1" dirty="0"/>
-              <a:t>d</a:t>
-            </a:r>
-            <a:endParaRPr lang="it-IT" sz="2000" dirty="0"/>
-          </a:p>
-        </p:txBody>
-      </p:sp>
-      <p:sp>
-        <p:nvSpPr>
-          <p:cNvPr id="10" name="Titolo 1">
+              <a:rPr lang="it-IT" sz="2200" b="1" i="1" dirty="0"/>
+              <a:t>d </a:t>
+            </a:r>
+            <a:r>
+              <a:rPr lang="it-IT" sz="2200" dirty="0"/>
+              <a:t>(</a:t>
+            </a:r>
+            <a:r>
+              <a:rPr lang="it-IT" sz="2200" dirty="0" err="1"/>
+              <a:t>function</a:t>
+            </a:r>
+            <a:r>
+              <a:rPr lang="it-IT" sz="2200" dirty="0"/>
+              <a:t> of </a:t>
+            </a:r>
+            <a:r>
+              <a:rPr lang="it-IT" sz="2200" b="1" dirty="0"/>
+              <a:t>N</a:t>
+            </a:r>
+            <a:r>
+              <a:rPr lang="it-IT" sz="2200" dirty="0"/>
+              <a:t>,</a:t>
+            </a:r>
+            <a:r>
+              <a:rPr lang="it-IT" sz="2200" b="1" dirty="0"/>
+              <a:t> L </a:t>
+            </a:r>
+            <a:r>
+              <a:rPr lang="it-IT" sz="2200" dirty="0"/>
+              <a:t>and</a:t>
+            </a:r>
+            <a:r>
+              <a:rPr lang="it-IT" sz="2200" b="1" dirty="0"/>
+              <a:t> a</a:t>
+            </a:r>
+            <a:r>
+              <a:rPr lang="it-IT" sz="2200" dirty="0"/>
+              <a:t>)</a:t>
+            </a:r>
+          </a:p>
+        </p:txBody>
+      </p:sp>
+      <p:sp>
+        <p:nvSpPr>
+          <p:cNvPr id="9" name="Segnaposto contenuto 2">
             <a:extLst>
               <a:ext uri="{FF2B5EF4-FFF2-40B4-BE49-F238E27FC236}">
-                <a16:creationId xmlns:a16="http://schemas.microsoft.com/office/drawing/2014/main" id="{26C12D70-BDAB-4D88-990A-1F017CFEFA9E}"/>
+                <a16:creationId xmlns:a16="http://schemas.microsoft.com/office/drawing/2014/main" id="{1B2C08AA-C0B9-4E12-B3B1-E190372D836A}"/>
               </a:ext>
             </a:extLst>
           </p:cNvPr>
@@ -8835,133 +9206,314 @@
         </p:nvSpPr>
         <p:spPr>
           <a:xfrm>
-            <a:off x="1234911" y="3803928"/>
-            <a:ext cx="9905998" cy="776140"/>
+            <a:off x="5890151" y="1492501"/>
+            <a:ext cx="4954587" cy="433633"/>
           </a:xfrm>
           <a:prstGeom prst="rect">
             <a:avLst/>
           </a:prstGeom>
         </p:spPr>
         <p:txBody>
-          <a:bodyPr vert="horz" lIns="91440" tIns="45720" rIns="91440" bIns="45720" rtlCol="0" anchor="ctr">
-            <a:normAutofit/>
+          <a:bodyPr vert="horz" lIns="91440" tIns="45720" rIns="91440" bIns="45720" rtlCol="0">
+            <a:normAutofit fontScale="85000" lnSpcReduction="20000"/>
           </a:bodyPr>
           <a:lstStyle>
-            <a:lvl1pPr algn="l" defTabSz="457200" rtl="0" eaLnBrk="1" latinLnBrk="0" hangingPunct="1">
+            <a:lvl1pPr marL="342900" indent="-342900" algn="l" defTabSz="457200" rtl="0" eaLnBrk="1" latinLnBrk="0" hangingPunct="1">
               <a:spcBef>
-                <a:spcPct val="0"/>
+                <a:spcPts val="1000"/>
               </a:spcBef>
-              <a:buNone/>
-              <a:defRPr sz="3200" kern="1200" cap="all">
-                <a:ln w="3175" cmpd="sng">
-                  <a:noFill/>
-                </a:ln>
-                <a:gradFill flip="none" rotWithShape="1">
-                  <a:gsLst>
-                    <a:gs pos="0">
-                      <a:schemeClr val="tx1"/>
-                    </a:gs>
-                    <a:gs pos="100000">
-                      <a:schemeClr val="tx1">
-                        <a:lumMod val="65000"/>
-                      </a:schemeClr>
-                    </a:gs>
-                  </a:gsLst>
-                  <a:lin ang="5580000" scaled="0"/>
-                  <a:tileRect/>
-                </a:gradFill>
-                <a:effectLst>
-                  <a:glow rad="38100">
-                    <a:schemeClr val="bg1">
-                      <a:lumMod val="65000"/>
-                      <a:lumOff val="35000"/>
-                      <a:alpha val="40000"/>
-                    </a:schemeClr>
-                  </a:glow>
-                  <a:outerShdw blurRad="28575" dist="38100" dir="14040000" algn="tl" rotWithShape="0">
-                    <a:srgbClr val="000000">
-                      <a:alpha val="25000"/>
-                    </a:srgbClr>
-                  </a:outerShdw>
-                </a:effectLst>
+              <a:spcAft>
+                <a:spcPts val="0"/>
+              </a:spcAft>
+              <a:buClr>
+                <a:schemeClr val="bg2">
+                  <a:lumMod val="40000"/>
+                  <a:lumOff val="60000"/>
+                </a:schemeClr>
+              </a:buClr>
+              <a:buSzPct val="80000"/>
+              <a:buFont typeface="Wingdings 3" charset="2"/>
+              <a:buChar char=""/>
+              <a:defRPr sz="2000" b="0" i="0" kern="1200">
+                <a:solidFill>
+                  <a:schemeClr val="tx1"/>
+                </a:solidFill>
                 <a:latin typeface="+mj-lt"/>
                 <a:ea typeface="+mj-ea"/>
                 <a:cs typeface="+mj-cs"/>
               </a:defRPr>
             </a:lvl1pPr>
-            <a:lvl2pPr eaLnBrk="1" hangingPunct="1">
-              <a:defRPr>
+            <a:lvl2pPr marL="742950" indent="-285750" algn="l" defTabSz="457200" rtl="0" eaLnBrk="1" latinLnBrk="0" hangingPunct="1">
+              <a:spcBef>
+                <a:spcPts val="1000"/>
+              </a:spcBef>
+              <a:spcAft>
+                <a:spcPts val="0"/>
+              </a:spcAft>
+              <a:buClr>
+                <a:schemeClr val="bg2">
+                  <a:lumMod val="40000"/>
+                  <a:lumOff val="60000"/>
+                </a:schemeClr>
+              </a:buClr>
+              <a:buSzPct val="80000"/>
+              <a:buFont typeface="Wingdings 3" charset="2"/>
+              <a:buChar char=""/>
+              <a:defRPr sz="1800" b="0" i="0" kern="1200">
                 <a:solidFill>
-                  <a:schemeClr val="tx2"/>
+                  <a:schemeClr val="tx1"/>
                 </a:solidFill>
+                <a:latin typeface="+mj-lt"/>
+                <a:ea typeface="+mj-ea"/>
+                <a:cs typeface="+mj-cs"/>
               </a:defRPr>
             </a:lvl2pPr>
-            <a:lvl3pPr eaLnBrk="1" hangingPunct="1">
-              <a:defRPr>
+            <a:lvl3pPr marL="1143000" indent="-228600" algn="l" defTabSz="457200" rtl="0" eaLnBrk="1" latinLnBrk="0" hangingPunct="1">
+              <a:spcBef>
+                <a:spcPts val="1000"/>
+              </a:spcBef>
+              <a:spcAft>
+                <a:spcPts val="0"/>
+              </a:spcAft>
+              <a:buClr>
+                <a:schemeClr val="bg2">
+                  <a:lumMod val="40000"/>
+                  <a:lumOff val="60000"/>
+                </a:schemeClr>
+              </a:buClr>
+              <a:buSzPct val="80000"/>
+              <a:buFont typeface="Wingdings 3" charset="2"/>
+              <a:buChar char=""/>
+              <a:defRPr sz="1600" b="0" i="0" kern="1200">
                 <a:solidFill>
-                  <a:schemeClr val="tx2"/>
+                  <a:schemeClr val="tx1"/>
                 </a:solidFill>
+                <a:latin typeface="+mj-lt"/>
+                <a:ea typeface="+mj-ea"/>
+                <a:cs typeface="+mj-cs"/>
               </a:defRPr>
             </a:lvl3pPr>
-            <a:lvl4pPr eaLnBrk="1" hangingPunct="1">
-              <a:defRPr>
+            <a:lvl4pPr marL="1600200" indent="-228600" algn="l" defTabSz="457200" rtl="0" eaLnBrk="1" latinLnBrk="0" hangingPunct="1">
+              <a:spcBef>
+                <a:spcPts val="1000"/>
+              </a:spcBef>
+              <a:spcAft>
+                <a:spcPts val="0"/>
+              </a:spcAft>
+              <a:buClr>
+                <a:schemeClr val="bg2">
+                  <a:lumMod val="40000"/>
+                  <a:lumOff val="60000"/>
+                </a:schemeClr>
+              </a:buClr>
+              <a:buSzPct val="80000"/>
+              <a:buFont typeface="Wingdings 3" charset="2"/>
+              <a:buChar char=""/>
+              <a:defRPr sz="1400" b="0" i="0" kern="1200">
                 <a:solidFill>
-                  <a:schemeClr val="tx2"/>
+                  <a:schemeClr val="tx1"/>
                 </a:solidFill>
+                <a:latin typeface="+mj-lt"/>
+                <a:ea typeface="+mj-ea"/>
+                <a:cs typeface="+mj-cs"/>
               </a:defRPr>
             </a:lvl4pPr>
-            <a:lvl5pPr eaLnBrk="1" hangingPunct="1">
-              <a:defRPr>
+            <a:lvl5pPr marL="2057400" indent="-228600" algn="l" defTabSz="457200" rtl="0" eaLnBrk="1" latinLnBrk="0" hangingPunct="1">
+              <a:spcBef>
+                <a:spcPts val="1000"/>
+              </a:spcBef>
+              <a:spcAft>
+                <a:spcPts val="0"/>
+              </a:spcAft>
+              <a:buClr>
+                <a:schemeClr val="bg2">
+                  <a:lumMod val="40000"/>
+                  <a:lumOff val="60000"/>
+                </a:schemeClr>
+              </a:buClr>
+              <a:buSzPct val="80000"/>
+              <a:buFont typeface="Wingdings 3" charset="2"/>
+              <a:buChar char=""/>
+              <a:defRPr sz="1400" b="0" i="0" kern="1200">
                 <a:solidFill>
-                  <a:schemeClr val="tx2"/>
+                  <a:schemeClr val="tx1"/>
                 </a:solidFill>
+                <a:latin typeface="+mj-lt"/>
+                <a:ea typeface="+mj-ea"/>
+                <a:cs typeface="+mj-cs"/>
               </a:defRPr>
             </a:lvl5pPr>
-            <a:lvl6pPr eaLnBrk="1" hangingPunct="1">
-              <a:defRPr>
+            <a:lvl6pPr marL="2506000" indent="-228600" algn="l" defTabSz="457200" rtl="0" eaLnBrk="1" latinLnBrk="0" hangingPunct="1">
+              <a:spcBef>
+                <a:spcPts val="1000"/>
+              </a:spcBef>
+              <a:spcAft>
+                <a:spcPts val="0"/>
+              </a:spcAft>
+              <a:buClr>
+                <a:schemeClr val="bg2">
+                  <a:lumMod val="40000"/>
+                  <a:lumOff val="60000"/>
+                </a:schemeClr>
+              </a:buClr>
+              <a:buSzPct val="80000"/>
+              <a:buFont typeface="Wingdings 3" charset="2"/>
+              <a:buChar char=""/>
+              <a:defRPr sz="1400" b="0" i="0" kern="1200">
                 <a:solidFill>
-                  <a:schemeClr val="tx2"/>
+                  <a:schemeClr val="tx1"/>
                 </a:solidFill>
+                <a:latin typeface="+mj-lt"/>
+                <a:ea typeface="+mj-ea"/>
+                <a:cs typeface="+mj-cs"/>
               </a:defRPr>
             </a:lvl6pPr>
-            <a:lvl7pPr eaLnBrk="1" hangingPunct="1">
-              <a:defRPr>
+            <a:lvl7pPr marL="2971800" indent="-228600" algn="l" defTabSz="457200" rtl="0" eaLnBrk="1" latinLnBrk="0" hangingPunct="1">
+              <a:spcBef>
+                <a:spcPts val="1000"/>
+              </a:spcBef>
+              <a:spcAft>
+                <a:spcPts val="0"/>
+              </a:spcAft>
+              <a:buClr>
+                <a:schemeClr val="bg2">
+                  <a:lumMod val="40000"/>
+                  <a:lumOff val="60000"/>
+                </a:schemeClr>
+              </a:buClr>
+              <a:buSzPct val="80000"/>
+              <a:buFont typeface="Wingdings 3" charset="2"/>
+              <a:buChar char=""/>
+              <a:defRPr sz="1400" b="0" i="0" kern="1200">
                 <a:solidFill>
-                  <a:schemeClr val="tx2"/>
+                  <a:schemeClr val="tx1"/>
                 </a:solidFill>
+                <a:latin typeface="+mj-lt"/>
+                <a:ea typeface="+mj-ea"/>
+                <a:cs typeface="+mj-cs"/>
               </a:defRPr>
             </a:lvl7pPr>
-            <a:lvl8pPr eaLnBrk="1" hangingPunct="1">
-              <a:defRPr>
+            <a:lvl8pPr marL="3429000" indent="-228600" algn="l" defTabSz="457200" rtl="0" eaLnBrk="1" latinLnBrk="0" hangingPunct="1">
+              <a:spcBef>
+                <a:spcPts val="1000"/>
+              </a:spcBef>
+              <a:spcAft>
+                <a:spcPts val="0"/>
+              </a:spcAft>
+              <a:buClr>
+                <a:schemeClr val="bg2">
+                  <a:lumMod val="40000"/>
+                  <a:lumOff val="60000"/>
+                </a:schemeClr>
+              </a:buClr>
+              <a:buSzPct val="80000"/>
+              <a:buFont typeface="Wingdings 3" charset="2"/>
+              <a:buChar char=""/>
+              <a:defRPr sz="1400" b="0" i="0" kern="1200">
                 <a:solidFill>
-                  <a:schemeClr val="tx2"/>
+                  <a:schemeClr val="tx1"/>
                 </a:solidFill>
+                <a:latin typeface="+mj-lt"/>
+                <a:ea typeface="+mj-ea"/>
+                <a:cs typeface="+mj-cs"/>
               </a:defRPr>
             </a:lvl8pPr>
-            <a:lvl9pPr eaLnBrk="1" hangingPunct="1">
-              <a:defRPr>
+            <a:lvl9pPr marL="3886200" indent="-228600" algn="l" defTabSz="457200" rtl="0" eaLnBrk="1" latinLnBrk="0" hangingPunct="1">
+              <a:spcBef>
+                <a:spcPts val="1000"/>
+              </a:spcBef>
+              <a:spcAft>
+                <a:spcPts val="0"/>
+              </a:spcAft>
+              <a:buClr>
+                <a:schemeClr val="bg2">
+                  <a:lumMod val="40000"/>
+                  <a:lumOff val="60000"/>
+                </a:schemeClr>
+              </a:buClr>
+              <a:buSzPct val="80000"/>
+              <a:buFont typeface="Wingdings 3" charset="2"/>
+              <a:buChar char=""/>
+              <a:defRPr sz="1400" b="0" i="0" kern="1200">
                 <a:solidFill>
-                  <a:schemeClr val="tx2"/>
+                  <a:schemeClr val="tx1"/>
                 </a:solidFill>
+                <a:latin typeface="+mj-lt"/>
+                <a:ea typeface="+mj-ea"/>
+                <a:cs typeface="+mj-cs"/>
               </a:defRPr>
             </a:lvl9pPr>
           </a:lstStyle>
           <a:p>
-            <a:pPr algn="ctr"/>
-            <a:r>
-              <a:rPr lang="it-IT" sz="2400" dirty="0" err="1"/>
-              <a:t>Conjectures</a:t>
-            </a:r>
-            <a:endParaRPr lang="it-IT" sz="2400" dirty="0"/>
-          </a:p>
-        </p:txBody>
-      </p:sp>
-      <p:sp>
-        <p:nvSpPr>
-          <p:cNvPr id="11" name="CasellaDiTesto 10">
+            <a:pPr marL="0" indent="0" algn="ctr">
+              <a:buFont typeface="Wingdings 3" charset="2"/>
+              <a:buNone/>
+            </a:pPr>
+            <a:r>
+              <a:rPr lang="it-IT" sz="3200" dirty="0"/>
+              <a:t>PARAMETERS</a:t>
+            </a:r>
+          </a:p>
+        </p:txBody>
+      </p:sp>
+      <p:sp>
+        <p:nvSpPr>
+          <p:cNvPr id="7" name="Rettangolo 6">
             <a:extLst>
               <a:ext uri="{FF2B5EF4-FFF2-40B4-BE49-F238E27FC236}">
-                <a16:creationId xmlns:a16="http://schemas.microsoft.com/office/drawing/2014/main" id="{8BF118C0-DDD9-4354-BD2D-A785ECC6E3DD}"/>
+                <a16:creationId xmlns:a16="http://schemas.microsoft.com/office/drawing/2014/main" id="{E02DC86F-437C-4705-9C13-F05B849E6D4E}"/>
+              </a:ext>
+            </a:extLst>
+          </p:cNvPr>
+          <p:cNvSpPr/>
+          <p:nvPr/>
+        </p:nvSpPr>
+        <p:spPr>
+          <a:xfrm>
+            <a:off x="6002502" y="2240436"/>
+            <a:ext cx="4121886" cy="1106079"/>
+          </a:xfrm>
+          <a:prstGeom prst="rect">
+            <a:avLst/>
+          </a:prstGeom>
+          <a:noFill/>
+          <a:ln w="57150">
+            <a:solidFill>
+              <a:srgbClr val="00B0F0"/>
+            </a:solidFill>
+          </a:ln>
+        </p:spPr>
+        <p:style>
+          <a:lnRef idx="2">
+            <a:schemeClr val="accent1">
+              <a:shade val="50000"/>
+            </a:schemeClr>
+          </a:lnRef>
+          <a:fillRef idx="1">
+            <a:schemeClr val="accent1"/>
+          </a:fillRef>
+          <a:effectRef idx="0">
+            <a:schemeClr val="accent1"/>
+          </a:effectRef>
+          <a:fontRef idx="minor">
+            <a:schemeClr val="lt1"/>
+          </a:fontRef>
+        </p:style>
+        <p:txBody>
+          <a:bodyPr rtlCol="0" anchor="ctr"/>
+          <a:lstStyle/>
+          <a:p>
+            <a:pPr algn="ctr"/>
+            <a:endParaRPr lang="it-IT"/>
+          </a:p>
+        </p:txBody>
+      </p:sp>
+      <p:sp>
+        <p:nvSpPr>
+          <p:cNvPr id="12" name="CasellaDiTesto 11">
+            <a:extLst>
+              <a:ext uri="{FF2B5EF4-FFF2-40B4-BE49-F238E27FC236}">
+                <a16:creationId xmlns:a16="http://schemas.microsoft.com/office/drawing/2014/main" id="{14D7114E-73EA-49D1-BCD4-83E6C47DE182}"/>
               </a:ext>
             </a:extLst>
           </p:cNvPr>
@@ -8970,8 +9522,8 @@
         </p:nvSpPr>
         <p:spPr>
           <a:xfrm>
-            <a:off x="1244338" y="4496586"/>
-            <a:ext cx="9963312" cy="1751814"/>
+            <a:off x="849967" y="5962254"/>
+            <a:ext cx="10490478" cy="430887"/>
           </a:xfrm>
           <a:prstGeom prst="rect">
             <a:avLst/>
@@ -8980,30 +9532,66 @@
         </p:spPr>
         <p:txBody>
           <a:bodyPr wrap="square" rtlCol="0">
-            <a:noAutofit/>
+            <a:spAutoFit/>
           </a:bodyPr>
           <a:lstStyle/>
           <a:p>
             <a:r>
-              <a:rPr lang="it-IT" b="1" i="1" dirty="0"/>
-              <a:t>R ↑		</a:t>
-            </a:r>
-            <a:r>
-              <a:rPr lang="it-IT" b="1" dirty="0">
-                <a:sym typeface="Wingdings" panose="05000000000000000000" pitchFamily="2" charset="2"/>
-              </a:rPr>
-              <a:t>		</a:t>
-            </a:r>
-            <a:r>
-              <a:rPr lang="it-IT" b="1" i="1" dirty="0">
-                <a:sym typeface="Wingdings" panose="05000000000000000000" pitchFamily="2" charset="2"/>
-              </a:rPr>
-              <a:t>C</a:t>
-            </a:r>
-            <a:r>
-              <a:rPr lang="it-IT" b="1" i="1" dirty="0"/>
-              <a:t> ↑</a:t>
-            </a:r>
+              <a:rPr lang="it-IT" sz="2200" dirty="0"/>
+              <a:t>			N = 100					L = 100 m						a = 1</a:t>
+            </a:r>
+          </a:p>
+        </p:txBody>
+      </p:sp>
+      <p:sp>
+        <p:nvSpPr>
+          <p:cNvPr id="13" name="CasellaDiTesto 12">
+            <a:extLst>
+              <a:ext uri="{FF2B5EF4-FFF2-40B4-BE49-F238E27FC236}">
+                <a16:creationId xmlns:a16="http://schemas.microsoft.com/office/drawing/2014/main" id="{24DB907F-7E57-4518-B4F0-0E9672A61BD7}"/>
+              </a:ext>
+            </a:extLst>
+          </p:cNvPr>
+          <p:cNvSpPr txBox="1"/>
+          <p:nvPr/>
+        </p:nvSpPr>
+        <p:spPr>
+          <a:xfrm>
+            <a:off x="10124388" y="2240436"/>
+            <a:ext cx="1644176" cy="1043619"/>
+          </a:xfrm>
+          <a:prstGeom prst="rect">
+            <a:avLst/>
+          </a:prstGeom>
+          <a:noFill/>
+        </p:spPr>
+        <p:txBody>
+          <a:bodyPr wrap="square" rtlCol="0">
+            <a:spAutoFit/>
+          </a:bodyPr>
+          <a:lstStyle/>
+          <a:p>
+            <a:pPr>
+              <a:lnSpc>
+                <a:spcPct val="150000"/>
+              </a:lnSpc>
+            </a:pPr>
+            <a:r>
+              <a:rPr lang="it-IT" sz="2200" dirty="0"/>
+              <a:t>1 m - 20 m</a:t>
+            </a:r>
+          </a:p>
+          <a:p>
+            <a:pPr>
+              <a:lnSpc>
+                <a:spcPct val="150000"/>
+              </a:lnSpc>
+            </a:pPr>
+            <a:r>
+              <a:rPr lang="it-IT" sz="2200"/>
+              <a:t>0.1 - 0.9</a:t>
+            </a:r>
+            <a:endParaRPr lang="it-IT" sz="2200" dirty="0"/>
           </a:p>
         </p:txBody>
       </p:sp>
@@ -9017,6 +9605,1564 @@
   <p:clrMapOvr>
     <a:masterClrMapping/>
   </p:clrMapOvr>
+  <p:timing>
+    <p:tnLst>
+      <p:par>
+        <p:cTn id="1" dur="indefinite" restart="never" nodeType="tmRoot">
+          <p:childTnLst>
+            <p:seq concurrent="1" nextAc="seek">
+              <p:cTn id="2" dur="indefinite" nodeType="mainSeq">
+                <p:childTnLst>
+                  <p:par>
+                    <p:cTn id="3" fill="hold">
+                      <p:stCondLst>
+                        <p:cond delay="indefinite"/>
+                      </p:stCondLst>
+                      <p:childTnLst>
+                        <p:par>
+                          <p:cTn id="4" fill="hold">
+                            <p:stCondLst>
+                              <p:cond delay="0"/>
+                            </p:stCondLst>
+                            <p:childTnLst>
+                              <p:par>
+                                <p:cTn id="5" presetID="10" presetClass="entr" presetSubtype="0" fill="hold" grpId="0" nodeType="clickEffect">
+                                  <p:stCondLst>
+                                    <p:cond delay="0"/>
+                                  </p:stCondLst>
+                                  <p:childTnLst>
+                                    <p:set>
+                                      <p:cBhvr>
+                                        <p:cTn id="6" dur="1" fill="hold">
+                                          <p:stCondLst>
+                                            <p:cond delay="0"/>
+                                          </p:stCondLst>
+                                        </p:cTn>
+                                        <p:tgtEl>
+                                          <p:spTgt spid="3">
+                                            <p:txEl>
+                                              <p:pRg st="0" end="0"/>
+                                            </p:txEl>
+                                          </p:spTgt>
+                                        </p:tgtEl>
+                                        <p:attrNameLst>
+                                          <p:attrName>style.visibility</p:attrName>
+                                        </p:attrNameLst>
+                                      </p:cBhvr>
+                                      <p:to>
+                                        <p:strVal val="visible"/>
+                                      </p:to>
+                                    </p:set>
+                                    <p:animEffect transition="in" filter="fade">
+                                      <p:cBhvr>
+                                        <p:cTn id="7" dur="500"/>
+                                        <p:tgtEl>
+                                          <p:spTgt spid="3">
+                                            <p:txEl>
+                                              <p:pRg st="0" end="0"/>
+                                            </p:txEl>
+                                          </p:spTgt>
+                                        </p:tgtEl>
+                                      </p:cBhvr>
+                                    </p:animEffect>
+                                  </p:childTnLst>
+                                </p:cTn>
+                              </p:par>
+                            </p:childTnLst>
+                          </p:cTn>
+                        </p:par>
+                      </p:childTnLst>
+                    </p:cTn>
+                  </p:par>
+                  <p:par>
+                    <p:cTn id="8" fill="hold">
+                      <p:stCondLst>
+                        <p:cond delay="indefinite"/>
+                      </p:stCondLst>
+                      <p:childTnLst>
+                        <p:par>
+                          <p:cTn id="9" fill="hold">
+                            <p:stCondLst>
+                              <p:cond delay="0"/>
+                            </p:stCondLst>
+                            <p:childTnLst>
+                              <p:par>
+                                <p:cTn id="10" presetID="2" presetClass="entr" presetSubtype="8" fill="hold" grpId="0" nodeType="clickEffect">
+                                  <p:stCondLst>
+                                    <p:cond delay="0"/>
+                                  </p:stCondLst>
+                                  <p:childTnLst>
+                                    <p:set>
+                                      <p:cBhvr>
+                                        <p:cTn id="11" dur="1" fill="hold">
+                                          <p:stCondLst>
+                                            <p:cond delay="0"/>
+                                          </p:stCondLst>
+                                        </p:cTn>
+                                        <p:tgtEl>
+                                          <p:spTgt spid="5">
+                                            <p:txEl>
+                                              <p:pRg st="0" end="0"/>
+                                            </p:txEl>
+                                          </p:spTgt>
+                                        </p:tgtEl>
+                                        <p:attrNameLst>
+                                          <p:attrName>style.visibility</p:attrName>
+                                        </p:attrNameLst>
+                                      </p:cBhvr>
+                                      <p:to>
+                                        <p:strVal val="visible"/>
+                                      </p:to>
+                                    </p:set>
+                                    <p:anim calcmode="lin" valueType="num">
+                                      <p:cBhvr additive="base">
+                                        <p:cTn id="12" dur="500" fill="hold"/>
+                                        <p:tgtEl>
+                                          <p:spTgt spid="5">
+                                            <p:txEl>
+                                              <p:pRg st="0" end="0"/>
+                                            </p:txEl>
+                                          </p:spTgt>
+                                        </p:tgtEl>
+                                        <p:attrNameLst>
+                                          <p:attrName>ppt_x</p:attrName>
+                                        </p:attrNameLst>
+                                      </p:cBhvr>
+                                      <p:tavLst>
+                                        <p:tav tm="0">
+                                          <p:val>
+                                            <p:strVal val="0-#ppt_w/2"/>
+                                          </p:val>
+                                        </p:tav>
+                                        <p:tav tm="100000">
+                                          <p:val>
+                                            <p:strVal val="#ppt_x"/>
+                                          </p:val>
+                                        </p:tav>
+                                      </p:tavLst>
+                                    </p:anim>
+                                    <p:anim calcmode="lin" valueType="num">
+                                      <p:cBhvr additive="base">
+                                        <p:cTn id="13" dur="500" fill="hold"/>
+                                        <p:tgtEl>
+                                          <p:spTgt spid="5">
+                                            <p:txEl>
+                                              <p:pRg st="0" end="0"/>
+                                            </p:txEl>
+                                          </p:spTgt>
+                                        </p:tgtEl>
+                                        <p:attrNameLst>
+                                          <p:attrName>ppt_y</p:attrName>
+                                        </p:attrNameLst>
+                                      </p:cBhvr>
+                                      <p:tavLst>
+                                        <p:tav tm="0">
+                                          <p:val>
+                                            <p:strVal val="#ppt_y"/>
+                                          </p:val>
+                                        </p:tav>
+                                        <p:tav tm="100000">
+                                          <p:val>
+                                            <p:strVal val="#ppt_y"/>
+                                          </p:val>
+                                        </p:tav>
+                                      </p:tavLst>
+                                    </p:anim>
+                                  </p:childTnLst>
+                                </p:cTn>
+                              </p:par>
+                            </p:childTnLst>
+                          </p:cTn>
+                        </p:par>
+                      </p:childTnLst>
+                    </p:cTn>
+                  </p:par>
+                  <p:par>
+                    <p:cTn id="14" fill="hold">
+                      <p:stCondLst>
+                        <p:cond delay="indefinite"/>
+                      </p:stCondLst>
+                      <p:childTnLst>
+                        <p:par>
+                          <p:cTn id="15" fill="hold">
+                            <p:stCondLst>
+                              <p:cond delay="0"/>
+                            </p:stCondLst>
+                            <p:childTnLst>
+                              <p:par>
+                                <p:cTn id="16" presetID="2" presetClass="entr" presetSubtype="8" fill="hold" grpId="0" nodeType="clickEffect">
+                                  <p:stCondLst>
+                                    <p:cond delay="0"/>
+                                  </p:stCondLst>
+                                  <p:childTnLst>
+                                    <p:set>
+                                      <p:cBhvr>
+                                        <p:cTn id="17" dur="1" fill="hold">
+                                          <p:stCondLst>
+                                            <p:cond delay="0"/>
+                                          </p:stCondLst>
+                                        </p:cTn>
+                                        <p:tgtEl>
+                                          <p:spTgt spid="5">
+                                            <p:txEl>
+                                              <p:pRg st="1" end="1"/>
+                                            </p:txEl>
+                                          </p:spTgt>
+                                        </p:tgtEl>
+                                        <p:attrNameLst>
+                                          <p:attrName>style.visibility</p:attrName>
+                                        </p:attrNameLst>
+                                      </p:cBhvr>
+                                      <p:to>
+                                        <p:strVal val="visible"/>
+                                      </p:to>
+                                    </p:set>
+                                    <p:anim calcmode="lin" valueType="num">
+                                      <p:cBhvr additive="base">
+                                        <p:cTn id="18" dur="500" fill="hold"/>
+                                        <p:tgtEl>
+                                          <p:spTgt spid="5">
+                                            <p:txEl>
+                                              <p:pRg st="1" end="1"/>
+                                            </p:txEl>
+                                          </p:spTgt>
+                                        </p:tgtEl>
+                                        <p:attrNameLst>
+                                          <p:attrName>ppt_x</p:attrName>
+                                        </p:attrNameLst>
+                                      </p:cBhvr>
+                                      <p:tavLst>
+                                        <p:tav tm="0">
+                                          <p:val>
+                                            <p:strVal val="0-#ppt_w/2"/>
+                                          </p:val>
+                                        </p:tav>
+                                        <p:tav tm="100000">
+                                          <p:val>
+                                            <p:strVal val="#ppt_x"/>
+                                          </p:val>
+                                        </p:tav>
+                                      </p:tavLst>
+                                    </p:anim>
+                                    <p:anim calcmode="lin" valueType="num">
+                                      <p:cBhvr additive="base">
+                                        <p:cTn id="19" dur="500" fill="hold"/>
+                                        <p:tgtEl>
+                                          <p:spTgt spid="5">
+                                            <p:txEl>
+                                              <p:pRg st="1" end="1"/>
+                                            </p:txEl>
+                                          </p:spTgt>
+                                        </p:tgtEl>
+                                        <p:attrNameLst>
+                                          <p:attrName>ppt_y</p:attrName>
+                                        </p:attrNameLst>
+                                      </p:cBhvr>
+                                      <p:tavLst>
+                                        <p:tav tm="0">
+                                          <p:val>
+                                            <p:strVal val="#ppt_y"/>
+                                          </p:val>
+                                        </p:tav>
+                                        <p:tav tm="100000">
+                                          <p:val>
+                                            <p:strVal val="#ppt_y"/>
+                                          </p:val>
+                                        </p:tav>
+                                      </p:tavLst>
+                                    </p:anim>
+                                  </p:childTnLst>
+                                </p:cTn>
+                              </p:par>
+                            </p:childTnLst>
+                          </p:cTn>
+                        </p:par>
+                      </p:childTnLst>
+                    </p:cTn>
+                  </p:par>
+                  <p:par>
+                    <p:cTn id="20" fill="hold">
+                      <p:stCondLst>
+                        <p:cond delay="indefinite"/>
+                      </p:stCondLst>
+                      <p:childTnLst>
+                        <p:par>
+                          <p:cTn id="21" fill="hold">
+                            <p:stCondLst>
+                              <p:cond delay="0"/>
+                            </p:stCondLst>
+                            <p:childTnLst>
+                              <p:par>
+                                <p:cTn id="22" presetID="2" presetClass="entr" presetSubtype="8" fill="hold" grpId="0" nodeType="clickEffect">
+                                  <p:stCondLst>
+                                    <p:cond delay="0"/>
+                                  </p:stCondLst>
+                                  <p:childTnLst>
+                                    <p:set>
+                                      <p:cBhvr>
+                                        <p:cTn id="23" dur="1" fill="hold">
+                                          <p:stCondLst>
+                                            <p:cond delay="0"/>
+                                          </p:stCondLst>
+                                        </p:cTn>
+                                        <p:tgtEl>
+                                          <p:spTgt spid="5">
+                                            <p:txEl>
+                                              <p:pRg st="2" end="2"/>
+                                            </p:txEl>
+                                          </p:spTgt>
+                                        </p:tgtEl>
+                                        <p:attrNameLst>
+                                          <p:attrName>style.visibility</p:attrName>
+                                        </p:attrNameLst>
+                                      </p:cBhvr>
+                                      <p:to>
+                                        <p:strVal val="visible"/>
+                                      </p:to>
+                                    </p:set>
+                                    <p:anim calcmode="lin" valueType="num">
+                                      <p:cBhvr additive="base">
+                                        <p:cTn id="24" dur="500" fill="hold"/>
+                                        <p:tgtEl>
+                                          <p:spTgt spid="5">
+                                            <p:txEl>
+                                              <p:pRg st="2" end="2"/>
+                                            </p:txEl>
+                                          </p:spTgt>
+                                        </p:tgtEl>
+                                        <p:attrNameLst>
+                                          <p:attrName>ppt_x</p:attrName>
+                                        </p:attrNameLst>
+                                      </p:cBhvr>
+                                      <p:tavLst>
+                                        <p:tav tm="0">
+                                          <p:val>
+                                            <p:strVal val="0-#ppt_w/2"/>
+                                          </p:val>
+                                        </p:tav>
+                                        <p:tav tm="100000">
+                                          <p:val>
+                                            <p:strVal val="#ppt_x"/>
+                                          </p:val>
+                                        </p:tav>
+                                      </p:tavLst>
+                                    </p:anim>
+                                    <p:anim calcmode="lin" valueType="num">
+                                      <p:cBhvr additive="base">
+                                        <p:cTn id="25" dur="500" fill="hold"/>
+                                        <p:tgtEl>
+                                          <p:spTgt spid="5">
+                                            <p:txEl>
+                                              <p:pRg st="2" end="2"/>
+                                            </p:txEl>
+                                          </p:spTgt>
+                                        </p:tgtEl>
+                                        <p:attrNameLst>
+                                          <p:attrName>ppt_y</p:attrName>
+                                        </p:attrNameLst>
+                                      </p:cBhvr>
+                                      <p:tavLst>
+                                        <p:tav tm="0">
+                                          <p:val>
+                                            <p:strVal val="#ppt_y"/>
+                                          </p:val>
+                                        </p:tav>
+                                        <p:tav tm="100000">
+                                          <p:val>
+                                            <p:strVal val="#ppt_y"/>
+                                          </p:val>
+                                        </p:tav>
+                                      </p:tavLst>
+                                    </p:anim>
+                                  </p:childTnLst>
+                                </p:cTn>
+                              </p:par>
+                            </p:childTnLst>
+                          </p:cTn>
+                        </p:par>
+                      </p:childTnLst>
+                    </p:cTn>
+                  </p:par>
+                  <p:par>
+                    <p:cTn id="26" fill="hold">
+                      <p:stCondLst>
+                        <p:cond delay="indefinite"/>
+                      </p:stCondLst>
+                      <p:childTnLst>
+                        <p:par>
+                          <p:cTn id="27" fill="hold">
+                            <p:stCondLst>
+                              <p:cond delay="0"/>
+                            </p:stCondLst>
+                            <p:childTnLst>
+                              <p:par>
+                                <p:cTn id="28" presetID="10" presetClass="entr" presetSubtype="0" fill="hold" grpId="0" nodeType="clickEffect">
+                                  <p:stCondLst>
+                                    <p:cond delay="0"/>
+                                  </p:stCondLst>
+                                  <p:childTnLst>
+                                    <p:set>
+                                      <p:cBhvr>
+                                        <p:cTn id="29" dur="1" fill="hold">
+                                          <p:stCondLst>
+                                            <p:cond delay="0"/>
+                                          </p:stCondLst>
+                                        </p:cTn>
+                                        <p:tgtEl>
+                                          <p:spTgt spid="9"/>
+                                        </p:tgtEl>
+                                        <p:attrNameLst>
+                                          <p:attrName>style.visibility</p:attrName>
+                                        </p:attrNameLst>
+                                      </p:cBhvr>
+                                      <p:to>
+                                        <p:strVal val="visible"/>
+                                      </p:to>
+                                    </p:set>
+                                    <p:animEffect transition="in" filter="fade">
+                                      <p:cBhvr>
+                                        <p:cTn id="30" dur="500"/>
+                                        <p:tgtEl>
+                                          <p:spTgt spid="9"/>
+                                        </p:tgtEl>
+                                      </p:cBhvr>
+                                    </p:animEffect>
+                                  </p:childTnLst>
+                                </p:cTn>
+                              </p:par>
+                            </p:childTnLst>
+                          </p:cTn>
+                        </p:par>
+                      </p:childTnLst>
+                    </p:cTn>
+                  </p:par>
+                  <p:par>
+                    <p:cTn id="31" fill="hold">
+                      <p:stCondLst>
+                        <p:cond delay="indefinite"/>
+                      </p:stCondLst>
+                      <p:childTnLst>
+                        <p:par>
+                          <p:cTn id="32" fill="hold">
+                            <p:stCondLst>
+                              <p:cond delay="0"/>
+                            </p:stCondLst>
+                            <p:childTnLst>
+                              <p:par>
+                                <p:cTn id="33" presetID="2" presetClass="entr" presetSubtype="2" fill="hold" grpId="0" nodeType="clickEffect">
+                                  <p:stCondLst>
+                                    <p:cond delay="0"/>
+                                  </p:stCondLst>
+                                  <p:childTnLst>
+                                    <p:set>
+                                      <p:cBhvr>
+                                        <p:cTn id="34" dur="1" fill="hold">
+                                          <p:stCondLst>
+                                            <p:cond delay="0"/>
+                                          </p:stCondLst>
+                                        </p:cTn>
+                                        <p:tgtEl>
+                                          <p:spTgt spid="6">
+                                            <p:txEl>
+                                              <p:pRg st="0" end="0"/>
+                                            </p:txEl>
+                                          </p:spTgt>
+                                        </p:tgtEl>
+                                        <p:attrNameLst>
+                                          <p:attrName>style.visibility</p:attrName>
+                                        </p:attrNameLst>
+                                      </p:cBhvr>
+                                      <p:to>
+                                        <p:strVal val="visible"/>
+                                      </p:to>
+                                    </p:set>
+                                    <p:anim calcmode="lin" valueType="num">
+                                      <p:cBhvr additive="base">
+                                        <p:cTn id="35" dur="500" fill="hold"/>
+                                        <p:tgtEl>
+                                          <p:spTgt spid="6">
+                                            <p:txEl>
+                                              <p:pRg st="0" end="0"/>
+                                            </p:txEl>
+                                          </p:spTgt>
+                                        </p:tgtEl>
+                                        <p:attrNameLst>
+                                          <p:attrName>ppt_x</p:attrName>
+                                        </p:attrNameLst>
+                                      </p:cBhvr>
+                                      <p:tavLst>
+                                        <p:tav tm="0">
+                                          <p:val>
+                                            <p:strVal val="1+#ppt_w/2"/>
+                                          </p:val>
+                                        </p:tav>
+                                        <p:tav tm="100000">
+                                          <p:val>
+                                            <p:strVal val="#ppt_x"/>
+                                          </p:val>
+                                        </p:tav>
+                                      </p:tavLst>
+                                    </p:anim>
+                                    <p:anim calcmode="lin" valueType="num">
+                                      <p:cBhvr additive="base">
+                                        <p:cTn id="36" dur="500" fill="hold"/>
+                                        <p:tgtEl>
+                                          <p:spTgt spid="6">
+                                            <p:txEl>
+                                              <p:pRg st="0" end="0"/>
+                                            </p:txEl>
+                                          </p:spTgt>
+                                        </p:tgtEl>
+                                        <p:attrNameLst>
+                                          <p:attrName>ppt_y</p:attrName>
+                                        </p:attrNameLst>
+                                      </p:cBhvr>
+                                      <p:tavLst>
+                                        <p:tav tm="0">
+                                          <p:val>
+                                            <p:strVal val="#ppt_y"/>
+                                          </p:val>
+                                        </p:tav>
+                                        <p:tav tm="100000">
+                                          <p:val>
+                                            <p:strVal val="#ppt_y"/>
+                                          </p:val>
+                                        </p:tav>
+                                      </p:tavLst>
+                                    </p:anim>
+                                  </p:childTnLst>
+                                </p:cTn>
+                              </p:par>
+                            </p:childTnLst>
+                          </p:cTn>
+                        </p:par>
+                      </p:childTnLst>
+                    </p:cTn>
+                  </p:par>
+                  <p:par>
+                    <p:cTn id="37" fill="hold">
+                      <p:stCondLst>
+                        <p:cond delay="indefinite"/>
+                      </p:stCondLst>
+                      <p:childTnLst>
+                        <p:par>
+                          <p:cTn id="38" fill="hold">
+                            <p:stCondLst>
+                              <p:cond delay="0"/>
+                            </p:stCondLst>
+                            <p:childTnLst>
+                              <p:par>
+                                <p:cTn id="39" presetID="2" presetClass="entr" presetSubtype="2" fill="hold" grpId="0" nodeType="clickEffect">
+                                  <p:stCondLst>
+                                    <p:cond delay="0"/>
+                                  </p:stCondLst>
+                                  <p:childTnLst>
+                                    <p:set>
+                                      <p:cBhvr>
+                                        <p:cTn id="40" dur="1" fill="hold">
+                                          <p:stCondLst>
+                                            <p:cond delay="0"/>
+                                          </p:stCondLst>
+                                        </p:cTn>
+                                        <p:tgtEl>
+                                          <p:spTgt spid="6">
+                                            <p:txEl>
+                                              <p:pRg st="1" end="1"/>
+                                            </p:txEl>
+                                          </p:spTgt>
+                                        </p:tgtEl>
+                                        <p:attrNameLst>
+                                          <p:attrName>style.visibility</p:attrName>
+                                        </p:attrNameLst>
+                                      </p:cBhvr>
+                                      <p:to>
+                                        <p:strVal val="visible"/>
+                                      </p:to>
+                                    </p:set>
+                                    <p:anim calcmode="lin" valueType="num">
+                                      <p:cBhvr additive="base">
+                                        <p:cTn id="41" dur="500" fill="hold"/>
+                                        <p:tgtEl>
+                                          <p:spTgt spid="6">
+                                            <p:txEl>
+                                              <p:pRg st="1" end="1"/>
+                                            </p:txEl>
+                                          </p:spTgt>
+                                        </p:tgtEl>
+                                        <p:attrNameLst>
+                                          <p:attrName>ppt_x</p:attrName>
+                                        </p:attrNameLst>
+                                      </p:cBhvr>
+                                      <p:tavLst>
+                                        <p:tav tm="0">
+                                          <p:val>
+                                            <p:strVal val="1+#ppt_w/2"/>
+                                          </p:val>
+                                        </p:tav>
+                                        <p:tav tm="100000">
+                                          <p:val>
+                                            <p:strVal val="#ppt_x"/>
+                                          </p:val>
+                                        </p:tav>
+                                      </p:tavLst>
+                                    </p:anim>
+                                    <p:anim calcmode="lin" valueType="num">
+                                      <p:cBhvr additive="base">
+                                        <p:cTn id="42" dur="500" fill="hold"/>
+                                        <p:tgtEl>
+                                          <p:spTgt spid="6">
+                                            <p:txEl>
+                                              <p:pRg st="1" end="1"/>
+                                            </p:txEl>
+                                          </p:spTgt>
+                                        </p:tgtEl>
+                                        <p:attrNameLst>
+                                          <p:attrName>ppt_y</p:attrName>
+                                        </p:attrNameLst>
+                                      </p:cBhvr>
+                                      <p:tavLst>
+                                        <p:tav tm="0">
+                                          <p:val>
+                                            <p:strVal val="#ppt_y"/>
+                                          </p:val>
+                                        </p:tav>
+                                        <p:tav tm="100000">
+                                          <p:val>
+                                            <p:strVal val="#ppt_y"/>
+                                          </p:val>
+                                        </p:tav>
+                                      </p:tavLst>
+                                    </p:anim>
+                                  </p:childTnLst>
+                                </p:cTn>
+                              </p:par>
+                            </p:childTnLst>
+                          </p:cTn>
+                        </p:par>
+                      </p:childTnLst>
+                    </p:cTn>
+                  </p:par>
+                  <p:par>
+                    <p:cTn id="43" fill="hold">
+                      <p:stCondLst>
+                        <p:cond delay="indefinite"/>
+                      </p:stCondLst>
+                      <p:childTnLst>
+                        <p:par>
+                          <p:cTn id="44" fill="hold">
+                            <p:stCondLst>
+                              <p:cond delay="0"/>
+                            </p:stCondLst>
+                            <p:childTnLst>
+                              <p:par>
+                                <p:cTn id="45" presetID="2" presetClass="entr" presetSubtype="2" fill="hold" grpId="0" nodeType="clickEffect">
+                                  <p:stCondLst>
+                                    <p:cond delay="0"/>
+                                  </p:stCondLst>
+                                  <p:childTnLst>
+                                    <p:set>
+                                      <p:cBhvr>
+                                        <p:cTn id="46" dur="1" fill="hold">
+                                          <p:stCondLst>
+                                            <p:cond delay="0"/>
+                                          </p:stCondLst>
+                                        </p:cTn>
+                                        <p:tgtEl>
+                                          <p:spTgt spid="6">
+                                            <p:txEl>
+                                              <p:pRg st="2" end="2"/>
+                                            </p:txEl>
+                                          </p:spTgt>
+                                        </p:tgtEl>
+                                        <p:attrNameLst>
+                                          <p:attrName>style.visibility</p:attrName>
+                                        </p:attrNameLst>
+                                      </p:cBhvr>
+                                      <p:to>
+                                        <p:strVal val="visible"/>
+                                      </p:to>
+                                    </p:set>
+                                    <p:anim calcmode="lin" valueType="num">
+                                      <p:cBhvr additive="base">
+                                        <p:cTn id="47" dur="500" fill="hold"/>
+                                        <p:tgtEl>
+                                          <p:spTgt spid="6">
+                                            <p:txEl>
+                                              <p:pRg st="2" end="2"/>
+                                            </p:txEl>
+                                          </p:spTgt>
+                                        </p:tgtEl>
+                                        <p:attrNameLst>
+                                          <p:attrName>ppt_x</p:attrName>
+                                        </p:attrNameLst>
+                                      </p:cBhvr>
+                                      <p:tavLst>
+                                        <p:tav tm="0">
+                                          <p:val>
+                                            <p:strVal val="1+#ppt_w/2"/>
+                                          </p:val>
+                                        </p:tav>
+                                        <p:tav tm="100000">
+                                          <p:val>
+                                            <p:strVal val="#ppt_x"/>
+                                          </p:val>
+                                        </p:tav>
+                                      </p:tavLst>
+                                    </p:anim>
+                                    <p:anim calcmode="lin" valueType="num">
+                                      <p:cBhvr additive="base">
+                                        <p:cTn id="48" dur="500" fill="hold"/>
+                                        <p:tgtEl>
+                                          <p:spTgt spid="6">
+                                            <p:txEl>
+                                              <p:pRg st="2" end="2"/>
+                                            </p:txEl>
+                                          </p:spTgt>
+                                        </p:tgtEl>
+                                        <p:attrNameLst>
+                                          <p:attrName>ppt_y</p:attrName>
+                                        </p:attrNameLst>
+                                      </p:cBhvr>
+                                      <p:tavLst>
+                                        <p:tav tm="0">
+                                          <p:val>
+                                            <p:strVal val="#ppt_y"/>
+                                          </p:val>
+                                        </p:tav>
+                                        <p:tav tm="100000">
+                                          <p:val>
+                                            <p:strVal val="#ppt_y"/>
+                                          </p:val>
+                                        </p:tav>
+                                      </p:tavLst>
+                                    </p:anim>
+                                  </p:childTnLst>
+                                </p:cTn>
+                              </p:par>
+                            </p:childTnLst>
+                          </p:cTn>
+                        </p:par>
+                      </p:childTnLst>
+                    </p:cTn>
+                  </p:par>
+                  <p:par>
+                    <p:cTn id="49" fill="hold">
+                      <p:stCondLst>
+                        <p:cond delay="indefinite"/>
+                      </p:stCondLst>
+                      <p:childTnLst>
+                        <p:par>
+                          <p:cTn id="50" fill="hold">
+                            <p:stCondLst>
+                              <p:cond delay="0"/>
+                            </p:stCondLst>
+                            <p:childTnLst>
+                              <p:par>
+                                <p:cTn id="51" presetID="2" presetClass="entr" presetSubtype="2" fill="hold" grpId="0" nodeType="clickEffect">
+                                  <p:stCondLst>
+                                    <p:cond delay="0"/>
+                                  </p:stCondLst>
+                                  <p:childTnLst>
+                                    <p:set>
+                                      <p:cBhvr>
+                                        <p:cTn id="52" dur="1" fill="hold">
+                                          <p:stCondLst>
+                                            <p:cond delay="0"/>
+                                          </p:stCondLst>
+                                        </p:cTn>
+                                        <p:tgtEl>
+                                          <p:spTgt spid="6">
+                                            <p:txEl>
+                                              <p:pRg st="3" end="3"/>
+                                            </p:txEl>
+                                          </p:spTgt>
+                                        </p:tgtEl>
+                                        <p:attrNameLst>
+                                          <p:attrName>style.visibility</p:attrName>
+                                        </p:attrNameLst>
+                                      </p:cBhvr>
+                                      <p:to>
+                                        <p:strVal val="visible"/>
+                                      </p:to>
+                                    </p:set>
+                                    <p:anim calcmode="lin" valueType="num">
+                                      <p:cBhvr additive="base">
+                                        <p:cTn id="53" dur="500" fill="hold"/>
+                                        <p:tgtEl>
+                                          <p:spTgt spid="6">
+                                            <p:txEl>
+                                              <p:pRg st="3" end="3"/>
+                                            </p:txEl>
+                                          </p:spTgt>
+                                        </p:tgtEl>
+                                        <p:attrNameLst>
+                                          <p:attrName>ppt_x</p:attrName>
+                                        </p:attrNameLst>
+                                      </p:cBhvr>
+                                      <p:tavLst>
+                                        <p:tav tm="0">
+                                          <p:val>
+                                            <p:strVal val="1+#ppt_w/2"/>
+                                          </p:val>
+                                        </p:tav>
+                                        <p:tav tm="100000">
+                                          <p:val>
+                                            <p:strVal val="#ppt_x"/>
+                                          </p:val>
+                                        </p:tav>
+                                      </p:tavLst>
+                                    </p:anim>
+                                    <p:anim calcmode="lin" valueType="num">
+                                      <p:cBhvr additive="base">
+                                        <p:cTn id="54" dur="500" fill="hold"/>
+                                        <p:tgtEl>
+                                          <p:spTgt spid="6">
+                                            <p:txEl>
+                                              <p:pRg st="3" end="3"/>
+                                            </p:txEl>
+                                          </p:spTgt>
+                                        </p:tgtEl>
+                                        <p:attrNameLst>
+                                          <p:attrName>ppt_y</p:attrName>
+                                        </p:attrNameLst>
+                                      </p:cBhvr>
+                                      <p:tavLst>
+                                        <p:tav tm="0">
+                                          <p:val>
+                                            <p:strVal val="#ppt_y"/>
+                                          </p:val>
+                                        </p:tav>
+                                        <p:tav tm="100000">
+                                          <p:val>
+                                            <p:strVal val="#ppt_y"/>
+                                          </p:val>
+                                        </p:tav>
+                                      </p:tavLst>
+                                    </p:anim>
+                                  </p:childTnLst>
+                                </p:cTn>
+                              </p:par>
+                            </p:childTnLst>
+                          </p:cTn>
+                        </p:par>
+                      </p:childTnLst>
+                    </p:cTn>
+                  </p:par>
+                  <p:par>
+                    <p:cTn id="55" fill="hold">
+                      <p:stCondLst>
+                        <p:cond delay="indefinite"/>
+                      </p:stCondLst>
+                      <p:childTnLst>
+                        <p:par>
+                          <p:cTn id="56" fill="hold">
+                            <p:stCondLst>
+                              <p:cond delay="0"/>
+                            </p:stCondLst>
+                            <p:childTnLst>
+                              <p:par>
+                                <p:cTn id="57" presetID="2" presetClass="entr" presetSubtype="2" fill="hold" grpId="0" nodeType="clickEffect">
+                                  <p:stCondLst>
+                                    <p:cond delay="0"/>
+                                  </p:stCondLst>
+                                  <p:childTnLst>
+                                    <p:set>
+                                      <p:cBhvr>
+                                        <p:cTn id="58" dur="1" fill="hold">
+                                          <p:stCondLst>
+                                            <p:cond delay="0"/>
+                                          </p:stCondLst>
+                                        </p:cTn>
+                                        <p:tgtEl>
+                                          <p:spTgt spid="6">
+                                            <p:txEl>
+                                              <p:pRg st="4" end="4"/>
+                                            </p:txEl>
+                                          </p:spTgt>
+                                        </p:tgtEl>
+                                        <p:attrNameLst>
+                                          <p:attrName>style.visibility</p:attrName>
+                                        </p:attrNameLst>
+                                      </p:cBhvr>
+                                      <p:to>
+                                        <p:strVal val="visible"/>
+                                      </p:to>
+                                    </p:set>
+                                    <p:anim calcmode="lin" valueType="num">
+                                      <p:cBhvr additive="base">
+                                        <p:cTn id="59" dur="500" fill="hold"/>
+                                        <p:tgtEl>
+                                          <p:spTgt spid="6">
+                                            <p:txEl>
+                                              <p:pRg st="4" end="4"/>
+                                            </p:txEl>
+                                          </p:spTgt>
+                                        </p:tgtEl>
+                                        <p:attrNameLst>
+                                          <p:attrName>ppt_x</p:attrName>
+                                        </p:attrNameLst>
+                                      </p:cBhvr>
+                                      <p:tavLst>
+                                        <p:tav tm="0">
+                                          <p:val>
+                                            <p:strVal val="1+#ppt_w/2"/>
+                                          </p:val>
+                                        </p:tav>
+                                        <p:tav tm="100000">
+                                          <p:val>
+                                            <p:strVal val="#ppt_x"/>
+                                          </p:val>
+                                        </p:tav>
+                                      </p:tavLst>
+                                    </p:anim>
+                                    <p:anim calcmode="lin" valueType="num">
+                                      <p:cBhvr additive="base">
+                                        <p:cTn id="60" dur="500" fill="hold"/>
+                                        <p:tgtEl>
+                                          <p:spTgt spid="6">
+                                            <p:txEl>
+                                              <p:pRg st="4" end="4"/>
+                                            </p:txEl>
+                                          </p:spTgt>
+                                        </p:tgtEl>
+                                        <p:attrNameLst>
+                                          <p:attrName>ppt_y</p:attrName>
+                                        </p:attrNameLst>
+                                      </p:cBhvr>
+                                      <p:tavLst>
+                                        <p:tav tm="0">
+                                          <p:val>
+                                            <p:strVal val="#ppt_y"/>
+                                          </p:val>
+                                        </p:tav>
+                                        <p:tav tm="100000">
+                                          <p:val>
+                                            <p:strVal val="#ppt_y"/>
+                                          </p:val>
+                                        </p:tav>
+                                      </p:tavLst>
+                                    </p:anim>
+                                  </p:childTnLst>
+                                </p:cTn>
+                              </p:par>
+                            </p:childTnLst>
+                          </p:cTn>
+                        </p:par>
+                      </p:childTnLst>
+                    </p:cTn>
+                  </p:par>
+                  <p:par>
+                    <p:cTn id="61" fill="hold">
+                      <p:stCondLst>
+                        <p:cond delay="indefinite"/>
+                      </p:stCondLst>
+                      <p:childTnLst>
+                        <p:par>
+                          <p:cTn id="62" fill="hold">
+                            <p:stCondLst>
+                              <p:cond delay="0"/>
+                            </p:stCondLst>
+                            <p:childTnLst>
+                              <p:par>
+                                <p:cTn id="63" presetID="2" presetClass="entr" presetSubtype="2" fill="hold" grpId="0" nodeType="clickEffect">
+                                  <p:stCondLst>
+                                    <p:cond delay="0"/>
+                                  </p:stCondLst>
+                                  <p:childTnLst>
+                                    <p:set>
+                                      <p:cBhvr>
+                                        <p:cTn id="64" dur="1" fill="hold">
+                                          <p:stCondLst>
+                                            <p:cond delay="0"/>
+                                          </p:stCondLst>
+                                        </p:cTn>
+                                        <p:tgtEl>
+                                          <p:spTgt spid="6">
+                                            <p:txEl>
+                                              <p:pRg st="5" end="5"/>
+                                            </p:txEl>
+                                          </p:spTgt>
+                                        </p:tgtEl>
+                                        <p:attrNameLst>
+                                          <p:attrName>style.visibility</p:attrName>
+                                        </p:attrNameLst>
+                                      </p:cBhvr>
+                                      <p:to>
+                                        <p:strVal val="visible"/>
+                                      </p:to>
+                                    </p:set>
+                                    <p:anim calcmode="lin" valueType="num">
+                                      <p:cBhvr additive="base">
+                                        <p:cTn id="65" dur="500" fill="hold"/>
+                                        <p:tgtEl>
+                                          <p:spTgt spid="6">
+                                            <p:txEl>
+                                              <p:pRg st="5" end="5"/>
+                                            </p:txEl>
+                                          </p:spTgt>
+                                        </p:tgtEl>
+                                        <p:attrNameLst>
+                                          <p:attrName>ppt_x</p:attrName>
+                                        </p:attrNameLst>
+                                      </p:cBhvr>
+                                      <p:tavLst>
+                                        <p:tav tm="0">
+                                          <p:val>
+                                            <p:strVal val="1+#ppt_w/2"/>
+                                          </p:val>
+                                        </p:tav>
+                                        <p:tav tm="100000">
+                                          <p:val>
+                                            <p:strVal val="#ppt_x"/>
+                                          </p:val>
+                                        </p:tav>
+                                      </p:tavLst>
+                                    </p:anim>
+                                    <p:anim calcmode="lin" valueType="num">
+                                      <p:cBhvr additive="base">
+                                        <p:cTn id="66" dur="500" fill="hold"/>
+                                        <p:tgtEl>
+                                          <p:spTgt spid="6">
+                                            <p:txEl>
+                                              <p:pRg st="5" end="5"/>
+                                            </p:txEl>
+                                          </p:spTgt>
+                                        </p:tgtEl>
+                                        <p:attrNameLst>
+                                          <p:attrName>ppt_y</p:attrName>
+                                        </p:attrNameLst>
+                                      </p:cBhvr>
+                                      <p:tavLst>
+                                        <p:tav tm="0">
+                                          <p:val>
+                                            <p:strVal val="#ppt_y"/>
+                                          </p:val>
+                                        </p:tav>
+                                        <p:tav tm="100000">
+                                          <p:val>
+                                            <p:strVal val="#ppt_y"/>
+                                          </p:val>
+                                        </p:tav>
+                                      </p:tavLst>
+                                    </p:anim>
+                                  </p:childTnLst>
+                                </p:cTn>
+                              </p:par>
+                            </p:childTnLst>
+                          </p:cTn>
+                        </p:par>
+                      </p:childTnLst>
+                    </p:cTn>
+                  </p:par>
+                  <p:par>
+                    <p:cTn id="67" fill="hold">
+                      <p:stCondLst>
+                        <p:cond delay="indefinite"/>
+                      </p:stCondLst>
+                      <p:childTnLst>
+                        <p:par>
+                          <p:cTn id="68" fill="hold">
+                            <p:stCondLst>
+                              <p:cond delay="0"/>
+                            </p:stCondLst>
+                            <p:childTnLst>
+                              <p:par>
+                                <p:cTn id="69" presetID="53" presetClass="entr" presetSubtype="16" fill="hold" grpId="0" nodeType="clickEffect">
+                                  <p:stCondLst>
+                                    <p:cond delay="0"/>
+                                  </p:stCondLst>
+                                  <p:childTnLst>
+                                    <p:set>
+                                      <p:cBhvr>
+                                        <p:cTn id="70" dur="1" fill="hold">
+                                          <p:stCondLst>
+                                            <p:cond delay="0"/>
+                                          </p:stCondLst>
+                                        </p:cTn>
+                                        <p:tgtEl>
+                                          <p:spTgt spid="7"/>
+                                        </p:tgtEl>
+                                        <p:attrNameLst>
+                                          <p:attrName>style.visibility</p:attrName>
+                                        </p:attrNameLst>
+                                      </p:cBhvr>
+                                      <p:to>
+                                        <p:strVal val="visible"/>
+                                      </p:to>
+                                    </p:set>
+                                    <p:anim calcmode="lin" valueType="num">
+                                      <p:cBhvr>
+                                        <p:cTn id="71" dur="500" fill="hold"/>
+                                        <p:tgtEl>
+                                          <p:spTgt spid="7"/>
+                                        </p:tgtEl>
+                                        <p:attrNameLst>
+                                          <p:attrName>ppt_w</p:attrName>
+                                        </p:attrNameLst>
+                                      </p:cBhvr>
+                                      <p:tavLst>
+                                        <p:tav tm="0">
+                                          <p:val>
+                                            <p:fltVal val="0"/>
+                                          </p:val>
+                                        </p:tav>
+                                        <p:tav tm="100000">
+                                          <p:val>
+                                            <p:strVal val="#ppt_w"/>
+                                          </p:val>
+                                        </p:tav>
+                                      </p:tavLst>
+                                    </p:anim>
+                                    <p:anim calcmode="lin" valueType="num">
+                                      <p:cBhvr>
+                                        <p:cTn id="72" dur="500" fill="hold"/>
+                                        <p:tgtEl>
+                                          <p:spTgt spid="7"/>
+                                        </p:tgtEl>
+                                        <p:attrNameLst>
+                                          <p:attrName>ppt_h</p:attrName>
+                                        </p:attrNameLst>
+                                      </p:cBhvr>
+                                      <p:tavLst>
+                                        <p:tav tm="0">
+                                          <p:val>
+                                            <p:fltVal val="0"/>
+                                          </p:val>
+                                        </p:tav>
+                                        <p:tav tm="100000">
+                                          <p:val>
+                                            <p:strVal val="#ppt_h"/>
+                                          </p:val>
+                                        </p:tav>
+                                      </p:tavLst>
+                                    </p:anim>
+                                    <p:animEffect transition="in" filter="fade">
+                                      <p:cBhvr>
+                                        <p:cTn id="73" dur="500"/>
+                                        <p:tgtEl>
+                                          <p:spTgt spid="7"/>
+                                        </p:tgtEl>
+                                      </p:cBhvr>
+                                    </p:animEffect>
+                                  </p:childTnLst>
+                                </p:cTn>
+                              </p:par>
+                            </p:childTnLst>
+                          </p:cTn>
+                        </p:par>
+                      </p:childTnLst>
+                    </p:cTn>
+                  </p:par>
+                  <p:par>
+                    <p:cTn id="74" fill="hold">
+                      <p:stCondLst>
+                        <p:cond delay="indefinite"/>
+                      </p:stCondLst>
+                      <p:childTnLst>
+                        <p:par>
+                          <p:cTn id="75" fill="hold">
+                            <p:stCondLst>
+                              <p:cond delay="0"/>
+                            </p:stCondLst>
+                            <p:childTnLst>
+                              <p:par>
+                                <p:cTn id="76" presetID="53" presetClass="exit" presetSubtype="32" fill="hold" grpId="1" nodeType="clickEffect">
+                                  <p:stCondLst>
+                                    <p:cond delay="0"/>
+                                  </p:stCondLst>
+                                  <p:childTnLst>
+                                    <p:anim calcmode="lin" valueType="num">
+                                      <p:cBhvr>
+                                        <p:cTn id="77" dur="500"/>
+                                        <p:tgtEl>
+                                          <p:spTgt spid="7"/>
+                                        </p:tgtEl>
+                                        <p:attrNameLst>
+                                          <p:attrName>ppt_w</p:attrName>
+                                        </p:attrNameLst>
+                                      </p:cBhvr>
+                                      <p:tavLst>
+                                        <p:tav tm="0">
+                                          <p:val>
+                                            <p:strVal val="ppt_w"/>
+                                          </p:val>
+                                        </p:tav>
+                                        <p:tav tm="100000">
+                                          <p:val>
+                                            <p:fltVal val="0"/>
+                                          </p:val>
+                                        </p:tav>
+                                      </p:tavLst>
+                                    </p:anim>
+                                    <p:anim calcmode="lin" valueType="num">
+                                      <p:cBhvr>
+                                        <p:cTn id="78" dur="500"/>
+                                        <p:tgtEl>
+                                          <p:spTgt spid="7"/>
+                                        </p:tgtEl>
+                                        <p:attrNameLst>
+                                          <p:attrName>ppt_h</p:attrName>
+                                        </p:attrNameLst>
+                                      </p:cBhvr>
+                                      <p:tavLst>
+                                        <p:tav tm="0">
+                                          <p:val>
+                                            <p:strVal val="ppt_h"/>
+                                          </p:val>
+                                        </p:tav>
+                                        <p:tav tm="100000">
+                                          <p:val>
+                                            <p:fltVal val="0"/>
+                                          </p:val>
+                                        </p:tav>
+                                      </p:tavLst>
+                                    </p:anim>
+                                    <p:animEffect transition="out" filter="fade">
+                                      <p:cBhvr>
+                                        <p:cTn id="79" dur="500"/>
+                                        <p:tgtEl>
+                                          <p:spTgt spid="7"/>
+                                        </p:tgtEl>
+                                      </p:cBhvr>
+                                    </p:animEffect>
+                                    <p:set>
+                                      <p:cBhvr>
+                                        <p:cTn id="80" dur="1" fill="hold">
+                                          <p:stCondLst>
+                                            <p:cond delay="499"/>
+                                          </p:stCondLst>
+                                        </p:cTn>
+                                        <p:tgtEl>
+                                          <p:spTgt spid="7"/>
+                                        </p:tgtEl>
+                                        <p:attrNameLst>
+                                          <p:attrName>style.visibility</p:attrName>
+                                        </p:attrNameLst>
+                                      </p:cBhvr>
+                                      <p:to>
+                                        <p:strVal val="hidden"/>
+                                      </p:to>
+                                    </p:set>
+                                  </p:childTnLst>
+                                </p:cTn>
+                              </p:par>
+                              <p:par>
+                                <p:cTn id="81" presetID="2" presetClass="entr" presetSubtype="2" fill="hold" grpId="0" nodeType="withEffect">
+                                  <p:stCondLst>
+                                    <p:cond delay="0"/>
+                                  </p:stCondLst>
+                                  <p:childTnLst>
+                                    <p:set>
+                                      <p:cBhvr>
+                                        <p:cTn id="82" dur="1" fill="hold">
+                                          <p:stCondLst>
+                                            <p:cond delay="0"/>
+                                          </p:stCondLst>
+                                        </p:cTn>
+                                        <p:tgtEl>
+                                          <p:spTgt spid="13">
+                                            <p:txEl>
+                                              <p:pRg st="0" end="0"/>
+                                            </p:txEl>
+                                          </p:spTgt>
+                                        </p:tgtEl>
+                                        <p:attrNameLst>
+                                          <p:attrName>style.visibility</p:attrName>
+                                        </p:attrNameLst>
+                                      </p:cBhvr>
+                                      <p:to>
+                                        <p:strVal val="visible"/>
+                                      </p:to>
+                                    </p:set>
+                                    <p:anim calcmode="lin" valueType="num">
+                                      <p:cBhvr additive="base">
+                                        <p:cTn id="83" dur="500" fill="hold"/>
+                                        <p:tgtEl>
+                                          <p:spTgt spid="13">
+                                            <p:txEl>
+                                              <p:pRg st="0" end="0"/>
+                                            </p:txEl>
+                                          </p:spTgt>
+                                        </p:tgtEl>
+                                        <p:attrNameLst>
+                                          <p:attrName>ppt_x</p:attrName>
+                                        </p:attrNameLst>
+                                      </p:cBhvr>
+                                      <p:tavLst>
+                                        <p:tav tm="0">
+                                          <p:val>
+                                            <p:strVal val="1+#ppt_w/2"/>
+                                          </p:val>
+                                        </p:tav>
+                                        <p:tav tm="100000">
+                                          <p:val>
+                                            <p:strVal val="#ppt_x"/>
+                                          </p:val>
+                                        </p:tav>
+                                      </p:tavLst>
+                                    </p:anim>
+                                    <p:anim calcmode="lin" valueType="num">
+                                      <p:cBhvr additive="base">
+                                        <p:cTn id="84" dur="500" fill="hold"/>
+                                        <p:tgtEl>
+                                          <p:spTgt spid="13">
+                                            <p:txEl>
+                                              <p:pRg st="0" end="0"/>
+                                            </p:txEl>
+                                          </p:spTgt>
+                                        </p:tgtEl>
+                                        <p:attrNameLst>
+                                          <p:attrName>ppt_y</p:attrName>
+                                        </p:attrNameLst>
+                                      </p:cBhvr>
+                                      <p:tavLst>
+                                        <p:tav tm="0">
+                                          <p:val>
+                                            <p:strVal val="#ppt_y"/>
+                                          </p:val>
+                                        </p:tav>
+                                        <p:tav tm="100000">
+                                          <p:val>
+                                            <p:strVal val="#ppt_y"/>
+                                          </p:val>
+                                        </p:tav>
+                                      </p:tavLst>
+                                    </p:anim>
+                                  </p:childTnLst>
+                                </p:cTn>
+                              </p:par>
+                            </p:childTnLst>
+                          </p:cTn>
+                        </p:par>
+                      </p:childTnLst>
+                    </p:cTn>
+                  </p:par>
+                  <p:par>
+                    <p:cTn id="85" fill="hold">
+                      <p:stCondLst>
+                        <p:cond delay="indefinite"/>
+                      </p:stCondLst>
+                      <p:childTnLst>
+                        <p:par>
+                          <p:cTn id="86" fill="hold">
+                            <p:stCondLst>
+                              <p:cond delay="0"/>
+                            </p:stCondLst>
+                            <p:childTnLst>
+                              <p:par>
+                                <p:cTn id="87" presetID="2" presetClass="entr" presetSubtype="2" fill="hold" grpId="0" nodeType="clickEffect">
+                                  <p:stCondLst>
+                                    <p:cond delay="0"/>
+                                  </p:stCondLst>
+                                  <p:childTnLst>
+                                    <p:set>
+                                      <p:cBhvr>
+                                        <p:cTn id="88" dur="1" fill="hold">
+                                          <p:stCondLst>
+                                            <p:cond delay="0"/>
+                                          </p:stCondLst>
+                                        </p:cTn>
+                                        <p:tgtEl>
+                                          <p:spTgt spid="13">
+                                            <p:txEl>
+                                              <p:pRg st="1" end="1"/>
+                                            </p:txEl>
+                                          </p:spTgt>
+                                        </p:tgtEl>
+                                        <p:attrNameLst>
+                                          <p:attrName>style.visibility</p:attrName>
+                                        </p:attrNameLst>
+                                      </p:cBhvr>
+                                      <p:to>
+                                        <p:strVal val="visible"/>
+                                      </p:to>
+                                    </p:set>
+                                    <p:anim calcmode="lin" valueType="num">
+                                      <p:cBhvr additive="base">
+                                        <p:cTn id="89" dur="500" fill="hold"/>
+                                        <p:tgtEl>
+                                          <p:spTgt spid="13">
+                                            <p:txEl>
+                                              <p:pRg st="1" end="1"/>
+                                            </p:txEl>
+                                          </p:spTgt>
+                                        </p:tgtEl>
+                                        <p:attrNameLst>
+                                          <p:attrName>ppt_x</p:attrName>
+                                        </p:attrNameLst>
+                                      </p:cBhvr>
+                                      <p:tavLst>
+                                        <p:tav tm="0">
+                                          <p:val>
+                                            <p:strVal val="1+#ppt_w/2"/>
+                                          </p:val>
+                                        </p:tav>
+                                        <p:tav tm="100000">
+                                          <p:val>
+                                            <p:strVal val="#ppt_x"/>
+                                          </p:val>
+                                        </p:tav>
+                                      </p:tavLst>
+                                    </p:anim>
+                                    <p:anim calcmode="lin" valueType="num">
+                                      <p:cBhvr additive="base">
+                                        <p:cTn id="90" dur="500" fill="hold"/>
+                                        <p:tgtEl>
+                                          <p:spTgt spid="13">
+                                            <p:txEl>
+                                              <p:pRg st="1" end="1"/>
+                                            </p:txEl>
+                                          </p:spTgt>
+                                        </p:tgtEl>
+                                        <p:attrNameLst>
+                                          <p:attrName>ppt_y</p:attrName>
+                                        </p:attrNameLst>
+                                      </p:cBhvr>
+                                      <p:tavLst>
+                                        <p:tav tm="0">
+                                          <p:val>
+                                            <p:strVal val="#ppt_y"/>
+                                          </p:val>
+                                        </p:tav>
+                                        <p:tav tm="100000">
+                                          <p:val>
+                                            <p:strVal val="#ppt_y"/>
+                                          </p:val>
+                                        </p:tav>
+                                      </p:tavLst>
+                                    </p:anim>
+                                  </p:childTnLst>
+                                </p:cTn>
+                              </p:par>
+                            </p:childTnLst>
+                          </p:cTn>
+                        </p:par>
+                      </p:childTnLst>
+                    </p:cTn>
+                  </p:par>
+                  <p:par>
+                    <p:cTn id="91" fill="hold">
+                      <p:stCondLst>
+                        <p:cond delay="indefinite"/>
+                      </p:stCondLst>
+                      <p:childTnLst>
+                        <p:par>
+                          <p:cTn id="92" fill="hold">
+                            <p:stCondLst>
+                              <p:cond delay="0"/>
+                            </p:stCondLst>
+                            <p:childTnLst>
+                              <p:par>
+                                <p:cTn id="93" presetID="2" presetClass="entr" presetSubtype="4" fill="hold" grpId="0" nodeType="clickEffect">
+                                  <p:stCondLst>
+                                    <p:cond delay="0"/>
+                                  </p:stCondLst>
+                                  <p:childTnLst>
+                                    <p:set>
+                                      <p:cBhvr>
+                                        <p:cTn id="94" dur="1" fill="hold">
+                                          <p:stCondLst>
+                                            <p:cond delay="0"/>
+                                          </p:stCondLst>
+                                        </p:cTn>
+                                        <p:tgtEl>
+                                          <p:spTgt spid="12"/>
+                                        </p:tgtEl>
+                                        <p:attrNameLst>
+                                          <p:attrName>style.visibility</p:attrName>
+                                        </p:attrNameLst>
+                                      </p:cBhvr>
+                                      <p:to>
+                                        <p:strVal val="visible"/>
+                                      </p:to>
+                                    </p:set>
+                                    <p:anim calcmode="lin" valueType="num">
+                                      <p:cBhvr additive="base">
+                                        <p:cTn id="95" dur="500" fill="hold"/>
+                                        <p:tgtEl>
+                                          <p:spTgt spid="12"/>
+                                        </p:tgtEl>
+                                        <p:attrNameLst>
+                                          <p:attrName>ppt_x</p:attrName>
+                                        </p:attrNameLst>
+                                      </p:cBhvr>
+                                      <p:tavLst>
+                                        <p:tav tm="0">
+                                          <p:val>
+                                            <p:strVal val="#ppt_x"/>
+                                          </p:val>
+                                        </p:tav>
+                                        <p:tav tm="100000">
+                                          <p:val>
+                                            <p:strVal val="#ppt_x"/>
+                                          </p:val>
+                                        </p:tav>
+                                      </p:tavLst>
+                                    </p:anim>
+                                    <p:anim calcmode="lin" valueType="num">
+                                      <p:cBhvr additive="base">
+                                        <p:cTn id="96" dur="500" fill="hold"/>
+                                        <p:tgtEl>
+                                          <p:spTgt spid="12"/>
+                                        </p:tgtEl>
+                                        <p:attrNameLst>
+                                          <p:attrName>ppt_y</p:attrName>
+                                        </p:attrNameLst>
+                                      </p:cBhvr>
+                                      <p:tavLst>
+                                        <p:tav tm="0">
+                                          <p:val>
+                                            <p:strVal val="1+#ppt_h/2"/>
+                                          </p:val>
+                                        </p:tav>
+                                        <p:tav tm="100000">
+                                          <p:val>
+                                            <p:strVal val="#ppt_y"/>
+                                          </p:val>
+                                        </p:tav>
+                                      </p:tavLst>
+                                    </p:anim>
+                                  </p:childTnLst>
+                                </p:cTn>
+                              </p:par>
+                            </p:childTnLst>
+                          </p:cTn>
+                        </p:par>
+                      </p:childTnLst>
+                    </p:cTn>
+                  </p:par>
+                </p:childTnLst>
+              </p:cTn>
+              <p:prevCondLst>
+                <p:cond evt="onPrev" delay="0">
+                  <p:tgtEl>
+                    <p:sldTgt/>
+                  </p:tgtEl>
+                </p:cond>
+              </p:prevCondLst>
+              <p:nextCondLst>
+                <p:cond evt="onNext" delay="0">
+                  <p:tgtEl>
+                    <p:sldTgt/>
+                  </p:tgtEl>
+                </p:cond>
+              </p:nextCondLst>
+            </p:seq>
+          </p:childTnLst>
+        </p:cTn>
+      </p:par>
+    </p:tnLst>
+    <p:bldLst>
+      <p:bldP spid="3" grpId="0" build="p"/>
+      <p:bldP spid="5" grpId="0" build="p"/>
+      <p:bldP spid="6" grpId="0" build="p"/>
+      <p:bldP spid="9" grpId="0"/>
+      <p:bldP spid="7" grpId="0" animBg="1"/>
+      <p:bldP spid="7" grpId="1" animBg="1"/>
+      <p:bldP spid="12" grpId="0"/>
+      <p:bldP spid="13" grpId="0" uiExpand="1" build="p"/>
+    </p:bldLst>
+  </p:timing>
 </p:sld>
 </file>
 
@@ -9079,8 +11225,8 @@
         </p:nvSpPr>
         <p:spPr>
           <a:xfrm>
-            <a:off x="650669" y="629266"/>
-            <a:ext cx="3330328" cy="1641986"/>
+            <a:off x="4430836" y="450157"/>
+            <a:ext cx="3330328" cy="841315"/>
           </a:xfrm>
         </p:spPr>
         <p:txBody>
@@ -9090,7 +11236,7 @@
           <a:lstStyle/>
           <a:p>
             <a:r>
-              <a:rPr lang="it-IT"/>
+              <a:rPr lang="it-IT" dirty="0" err="1"/>
               <a:t>Modelling</a:t>
             </a:r>
             <a:endParaRPr lang="it-IT" dirty="0"/>
@@ -9126,42 +11272,48 @@
           <a:lstStyle/>
           <a:p>
             <a:r>
-              <a:rPr lang="it-IT"/>
-              <a:t>Graph modelling and graph properties useful for the study</a:t>
-            </a:r>
-            <a:endParaRPr lang="it-IT" dirty="0"/>
-          </a:p>
-        </p:txBody>
-      </p:sp>
-      <p:pic>
-        <p:nvPicPr>
-          <p:cNvPr id="5" name="Picture 4" descr="Graph on document with pen">
-            <a:extLst>
-              <a:ext uri="{FF2B5EF4-FFF2-40B4-BE49-F238E27FC236}">
-                <a16:creationId xmlns:a16="http://schemas.microsoft.com/office/drawing/2014/main" id="{22CF447B-CAE6-43BC-9BAA-C2112648B203}"/>
-              </a:ext>
-            </a:extLst>
-          </p:cNvPr>
-          <p:cNvPicPr>
-            <a:picLocks noChangeAspect="1"/>
-          </p:cNvPicPr>
-          <p:nvPr/>
-        </p:nvPicPr>
-        <p:blipFill rotWithShape="1">
-          <a:blip r:embed="rId3"/>
-          <a:srcRect l="20069" r="6346" b="-1"/>
-          <a:stretch/>
-        </p:blipFill>
-        <p:spPr>
-          <a:xfrm>
-            <a:off x="4634680" y="10"/>
-            <a:ext cx="7560130" cy="6857990"/>
-          </a:xfrm>
-          <a:prstGeom prst="rect">
-            <a:avLst/>
-          </a:prstGeom>
-        </p:spPr>
-      </p:pic>
+              <a:rPr lang="it-IT" dirty="0" err="1"/>
+              <a:t>Graph</a:t>
+            </a:r>
+            <a:r>
+              <a:rPr lang="it-IT" dirty="0"/>
+              <a:t> </a:t>
+            </a:r>
+            <a:r>
+              <a:rPr lang="it-IT" dirty="0" err="1"/>
+              <a:t>modelling</a:t>
+            </a:r>
+            <a:r>
+              <a:rPr lang="it-IT" dirty="0"/>
+              <a:t> and </a:t>
+            </a:r>
+            <a:r>
+              <a:rPr lang="it-IT" dirty="0" err="1"/>
+              <a:t>graph</a:t>
+            </a:r>
+            <a:r>
+              <a:rPr lang="it-IT" dirty="0"/>
+              <a:t> </a:t>
+            </a:r>
+            <a:r>
+              <a:rPr lang="it-IT" dirty="0" err="1"/>
+              <a:t>properties</a:t>
+            </a:r>
+            <a:r>
+              <a:rPr lang="it-IT" dirty="0"/>
+              <a:t> </a:t>
+            </a:r>
+            <a:r>
+              <a:rPr lang="it-IT" dirty="0" err="1"/>
+              <a:t>useful</a:t>
+            </a:r>
+            <a:r>
+              <a:rPr lang="it-IT" dirty="0"/>
+              <a:t> for the study</a:t>
+            </a:r>
+          </a:p>
+        </p:txBody>
+      </p:sp>
     </p:spTree>
     <p:extLst>
       <p:ext uri="{BB962C8B-B14F-4D97-AF65-F5344CB8AC3E}">
@@ -9184,9 +11336,6 @@
                     <p:cTn id="3" fill="hold">
                       <p:stCondLst>
                         <p:cond delay="indefinite"/>
-                        <p:cond evt="onBegin" delay="0">
-                          <p:tn val="2"/>
-                        </p:cond>
                       </p:stCondLst>
                       <p:childTnLst>
                         <p:par>
@@ -9196,13 +11345,10 @@
                             </p:stCondLst>
                             <p:childTnLst>
                               <p:par>
-                                <p:cTn id="5" presetID="10" presetClass="entr" presetSubtype="0" fill="hold" nodeType="withEffect">
+                                <p:cTn id="5" presetID="10" presetClass="entr" presetSubtype="0" fill="hold" grpId="0" nodeType="clickEffect">
                                   <p:stCondLst>
                                     <p:cond delay="0"/>
                                   </p:stCondLst>
-                                  <p:iterate>
-                                    <p:tmPct val="10000"/>
-                                  </p:iterate>
                                   <p:childTnLst>
                                     <p:set>
                                       <p:cBhvr>
@@ -9212,7 +11358,11 @@
                                           </p:stCondLst>
                                         </p:cTn>
                                         <p:tgtEl>
-                                          <p:spTgt spid="5"/>
+                                          <p:spTgt spid="3">
+                                            <p:txEl>
+                                              <p:pRg st="0" end="0"/>
+                                            </p:txEl>
+                                          </p:spTgt>
                                         </p:tgtEl>
                                         <p:attrNameLst>
                                           <p:attrName>style.visibility</p:attrName>
@@ -9224,47 +11374,13 @@
                                     </p:set>
                                     <p:animEffect transition="in" filter="fade">
                                       <p:cBhvr>
-                                        <p:cTn id="7" dur="700"/>
+                                        <p:cTn id="7" dur="500"/>
                                         <p:tgtEl>
-                                          <p:spTgt spid="5"/>
-                                        </p:tgtEl>
-                                      </p:cBhvr>
-                                    </p:animEffect>
-                                  </p:childTnLst>
-                                </p:cTn>
-                              </p:par>
-                              <p:par>
-                                <p:cTn id="8" presetID="10" presetClass="entr" presetSubtype="0" fill="hold" grpId="0" nodeType="withEffect">
-                                  <p:stCondLst>
-                                    <p:cond delay="1000"/>
-                                  </p:stCondLst>
-                                  <p:iterate type="lt">
-                                    <p:tmPct val="10000"/>
-                                  </p:iterate>
-                                  <p:childTnLst>
-                                    <p:set>
-                                      <p:cBhvr>
-                                        <p:cTn id="9" dur="1" fill="hold">
-                                          <p:stCondLst>
-                                            <p:cond delay="0"/>
-                                          </p:stCondLst>
-                                        </p:cTn>
-                                        <p:tgtEl>
-                                          <p:spTgt spid="2"/>
-                                        </p:tgtEl>
-                                        <p:attrNameLst>
-                                          <p:attrName>style.visibility</p:attrName>
-                                        </p:attrNameLst>
-                                      </p:cBhvr>
-                                      <p:to>
-                                        <p:strVal val="visible"/>
-                                      </p:to>
-                                    </p:set>
-                                    <p:animEffect transition="in" filter="fade">
-                                      <p:cBhvr>
-                                        <p:cTn id="10" dur="400"/>
-                                        <p:tgtEl>
-                                          <p:spTgt spid="2"/>
+                                          <p:spTgt spid="3">
+                                            <p:txEl>
+                                              <p:pRg st="0" end="0"/>
+                                            </p:txEl>
+                                          </p:spTgt>
                                         </p:tgtEl>
                                       </p:cBhvr>
                                     </p:animEffect>
@@ -9299,7 +11415,7 @@
       </p:par>
     </p:tnLst>
     <p:bldLst>
-      <p:bldP spid="2" grpId="0"/>
+      <p:bldP spid="3" grpId="0" build="p"/>
     </p:bldLst>
   </p:timing>
 </p:sld>

</xml_diff>

<commit_message>
Fix typo in pptx presentation
</commit_message>
<xml_diff>
--- a/documentation/powerpoint/epidemic_broadcast.pptx
+++ b/documentation/powerpoint/epidemic_broadcast.pptx
@@ -209,7 +209,7 @@
           <a:p>
             <a:fld id="{942B80C5-12B0-464F-9C73-F4ECDB97F0F1}" type="datetimeFigureOut">
               <a:rPr lang="it-IT" smtClean="0"/>
-              <a:t>03/05/2021</a:t>
+              <a:t>05/05/2021</a:t>
             </a:fld>
             <a:endParaRPr lang="it-IT"/>
           </a:p>
@@ -947,7 +947,7 @@
           <a:p>
             <a:fld id="{6C480ED4-4340-44DD-9FF4-A6B640604EAC}" type="datetimeFigureOut">
               <a:rPr lang="it-IT" smtClean="0"/>
-              <a:t>03/05/2021</a:t>
+              <a:t>05/05/2021</a:t>
             </a:fld>
             <a:endParaRPr lang="it-IT" dirty="0"/>
           </a:p>
@@ -1222,7 +1222,7 @@
           <a:p>
             <a:fld id="{6C480ED4-4340-44DD-9FF4-A6B640604EAC}" type="datetimeFigureOut">
               <a:rPr lang="it-IT" smtClean="0"/>
-              <a:t>03/05/2021</a:t>
+              <a:t>05/05/2021</a:t>
             </a:fld>
             <a:endParaRPr lang="it-IT" dirty="0"/>
           </a:p>
@@ -1416,7 +1416,7 @@
           <a:p>
             <a:fld id="{6C480ED4-4340-44DD-9FF4-A6B640604EAC}" type="datetimeFigureOut">
               <a:rPr lang="it-IT" smtClean="0"/>
-              <a:t>03/05/2021</a:t>
+              <a:t>05/05/2021</a:t>
             </a:fld>
             <a:endParaRPr lang="it-IT" dirty="0"/>
           </a:p>
@@ -1689,7 +1689,7 @@
           <a:p>
             <a:fld id="{6C480ED4-4340-44DD-9FF4-A6B640604EAC}" type="datetimeFigureOut">
               <a:rPr lang="it-IT" smtClean="0"/>
-              <a:t>03/05/2021</a:t>
+              <a:t>05/05/2021</a:t>
             </a:fld>
             <a:endParaRPr lang="it-IT" dirty="0"/>
           </a:p>
@@ -2030,7 +2030,7 @@
           <a:p>
             <a:fld id="{6C480ED4-4340-44DD-9FF4-A6B640604EAC}" type="datetimeFigureOut">
               <a:rPr lang="it-IT" smtClean="0"/>
-              <a:t>03/05/2021</a:t>
+              <a:t>05/05/2021</a:t>
             </a:fld>
             <a:endParaRPr lang="it-IT" dirty="0"/>
           </a:p>
@@ -2653,7 +2653,7 @@
           <a:p>
             <a:fld id="{6C480ED4-4340-44DD-9FF4-A6B640604EAC}" type="datetimeFigureOut">
               <a:rPr lang="it-IT" smtClean="0"/>
-              <a:t>03/05/2021</a:t>
+              <a:t>05/05/2021</a:t>
             </a:fld>
             <a:endParaRPr lang="it-IT" dirty="0"/>
           </a:p>
@@ -3513,7 +3513,7 @@
           <a:p>
             <a:fld id="{6C480ED4-4340-44DD-9FF4-A6B640604EAC}" type="datetimeFigureOut">
               <a:rPr lang="it-IT" smtClean="0"/>
-              <a:t>03/05/2021</a:t>
+              <a:t>05/05/2021</a:t>
             </a:fld>
             <a:endParaRPr lang="it-IT" dirty="0"/>
           </a:p>
@@ -3683,7 +3683,7 @@
           <a:p>
             <a:fld id="{6C480ED4-4340-44DD-9FF4-A6B640604EAC}" type="datetimeFigureOut">
               <a:rPr lang="it-IT" smtClean="0"/>
-              <a:t>03/05/2021</a:t>
+              <a:t>05/05/2021</a:t>
             </a:fld>
             <a:endParaRPr lang="it-IT" dirty="0"/>
           </a:p>
@@ -3863,7 +3863,7 @@
           <a:p>
             <a:fld id="{6C480ED4-4340-44DD-9FF4-A6B640604EAC}" type="datetimeFigureOut">
               <a:rPr lang="it-IT" smtClean="0"/>
-              <a:t>03/05/2021</a:t>
+              <a:t>05/05/2021</a:t>
             </a:fld>
             <a:endParaRPr lang="it-IT" dirty="0"/>
           </a:p>
@@ -4033,7 +4033,7 @@
           <a:p>
             <a:fld id="{6C480ED4-4340-44DD-9FF4-A6B640604EAC}" type="datetimeFigureOut">
               <a:rPr lang="it-IT" smtClean="0"/>
-              <a:t>03/05/2021</a:t>
+              <a:t>05/05/2021</a:t>
             </a:fld>
             <a:endParaRPr lang="it-IT" dirty="0"/>
           </a:p>
@@ -4280,7 +4280,7 @@
           <a:p>
             <a:fld id="{6C480ED4-4340-44DD-9FF4-A6B640604EAC}" type="datetimeFigureOut">
               <a:rPr lang="it-IT" smtClean="0"/>
-              <a:t>03/05/2021</a:t>
+              <a:t>05/05/2021</a:t>
             </a:fld>
             <a:endParaRPr lang="it-IT" dirty="0"/>
           </a:p>
@@ -4572,7 +4572,7 @@
           <a:p>
             <a:fld id="{6C480ED4-4340-44DD-9FF4-A6B640604EAC}" type="datetimeFigureOut">
               <a:rPr lang="it-IT" smtClean="0"/>
-              <a:t>03/05/2021</a:t>
+              <a:t>05/05/2021</a:t>
             </a:fld>
             <a:endParaRPr lang="it-IT" dirty="0"/>
           </a:p>
@@ -5016,7 +5016,7 @@
           <a:p>
             <a:fld id="{6C480ED4-4340-44DD-9FF4-A6B640604EAC}" type="datetimeFigureOut">
               <a:rPr lang="it-IT" smtClean="0"/>
-              <a:t>03/05/2021</a:t>
+              <a:t>05/05/2021</a:t>
             </a:fld>
             <a:endParaRPr lang="it-IT" dirty="0"/>
           </a:p>
@@ -5134,7 +5134,7 @@
           <a:p>
             <a:fld id="{6C480ED4-4340-44DD-9FF4-A6B640604EAC}" type="datetimeFigureOut">
               <a:rPr lang="it-IT" smtClean="0"/>
-              <a:t>03/05/2021</a:t>
+              <a:t>05/05/2021</a:t>
             </a:fld>
             <a:endParaRPr lang="it-IT" dirty="0"/>
           </a:p>
@@ -5229,7 +5229,7 @@
           <a:p>
             <a:fld id="{6C480ED4-4340-44DD-9FF4-A6B640604EAC}" type="datetimeFigureOut">
               <a:rPr lang="it-IT" smtClean="0"/>
-              <a:t>03/05/2021</a:t>
+              <a:t>05/05/2021</a:t>
             </a:fld>
             <a:endParaRPr lang="it-IT" dirty="0"/>
           </a:p>
@@ -5508,7 +5508,7 @@
           <a:p>
             <a:fld id="{6C480ED4-4340-44DD-9FF4-A6B640604EAC}" type="datetimeFigureOut">
               <a:rPr lang="it-IT" smtClean="0"/>
-              <a:t>03/05/2021</a:t>
+              <a:t>05/05/2021</a:t>
             </a:fld>
             <a:endParaRPr lang="it-IT" dirty="0"/>
           </a:p>
@@ -5783,7 +5783,7 @@
           <a:p>
             <a:fld id="{6C480ED4-4340-44DD-9FF4-A6B640604EAC}" type="datetimeFigureOut">
               <a:rPr lang="it-IT" smtClean="0"/>
-              <a:t>03/05/2021</a:t>
+              <a:t>05/05/2021</a:t>
             </a:fld>
             <a:endParaRPr lang="it-IT" dirty="0"/>
           </a:p>
@@ -6212,7 +6212,7 @@
           <a:p>
             <a:fld id="{6C480ED4-4340-44DD-9FF4-A6B640604EAC}" type="datetimeFigureOut">
               <a:rPr lang="it-IT" smtClean="0"/>
-              <a:t>03/05/2021</a:t>
+              <a:t>05/05/2021</a:t>
             </a:fld>
             <a:endParaRPr lang="it-IT" dirty="0"/>
           </a:p>
@@ -8235,8 +8235,8 @@
           </a:p>
         </p:txBody>
       </p:sp>
-      <mc:AlternateContent xmlns:mc="http://schemas.openxmlformats.org/markup-compatibility/2006">
-        <mc:Choice xmlns:a14="http://schemas.microsoft.com/office/drawing/2010/main" Requires="a14">
+      <mc:AlternateContent xmlns:mc="http://schemas.openxmlformats.org/markup-compatibility/2006" xmlns:a14="http://schemas.microsoft.com/office/drawing/2010/main">
+        <mc:Choice Requires="a14">
           <p:sp>
             <p:nvSpPr>
               <p:cNvPr id="7" name="Segnaposto contenuto 2">
@@ -9015,7 +9015,7 @@
             </p:txBody>
           </p:sp>
         </mc:Choice>
-        <mc:Fallback>
+        <mc:Fallback xmlns="">
           <p:sp>
             <p:nvSpPr>
               <p:cNvPr id="7" name="Segnaposto contenuto 2">
@@ -9060,8 +9060,8 @@
           </p:sp>
         </mc:Fallback>
       </mc:AlternateContent>
-      <mc:AlternateContent xmlns:mc="http://schemas.openxmlformats.org/markup-compatibility/2006">
-        <mc:Choice xmlns:a14="http://schemas.microsoft.com/office/drawing/2010/main" Requires="a14">
+      <mc:AlternateContent xmlns:mc="http://schemas.openxmlformats.org/markup-compatibility/2006" xmlns:a14="http://schemas.microsoft.com/office/drawing/2010/main">
+        <mc:Choice Requires="a14">
           <p:sp>
             <p:nvSpPr>
               <p:cNvPr id="14" name="Segnaposto contenuto 2">
@@ -9836,7 +9836,7 @@
             </p:txBody>
           </p:sp>
         </mc:Choice>
-        <mc:Fallback>
+        <mc:Fallback xmlns="">
           <p:sp>
             <p:nvSpPr>
               <p:cNvPr id="14" name="Segnaposto contenuto 2">
@@ -9933,7 +9933,7 @@
         </p:blipFill>
         <p:spPr>
           <a:xfrm>
-            <a:off x="7079530" y="3148553"/>
+            <a:off x="6769411" y="3203569"/>
             <a:ext cx="4467339" cy="3418349"/>
           </a:xfrm>
           <a:prstGeom prst="rect">
@@ -10644,8 +10644,8 @@
           </a:p>
         </p:txBody>
       </p:sp>
-      <mc:AlternateContent xmlns:mc="http://schemas.openxmlformats.org/markup-compatibility/2006">
-        <mc:Choice xmlns:a14="http://schemas.microsoft.com/office/drawing/2010/main" Requires="a14">
+      <mc:AlternateContent xmlns:mc="http://schemas.openxmlformats.org/markup-compatibility/2006" xmlns:a14="http://schemas.microsoft.com/office/drawing/2010/main">
+        <mc:Choice Requires="a14">
           <p:sp>
             <p:nvSpPr>
               <p:cNvPr id="3" name="Segnaposto contenuto 2">
@@ -10758,7 +10758,7 @@
             </p:txBody>
           </p:sp>
         </mc:Choice>
-        <mc:Fallback>
+        <mc:Fallback xmlns="">
           <p:sp>
             <p:nvSpPr>
               <p:cNvPr id="3" name="Segnaposto contenuto 2">
@@ -10832,8 +10832,8 @@
           </a:prstGeom>
         </p:spPr>
       </p:pic>
-      <mc:AlternateContent xmlns:mc="http://schemas.openxmlformats.org/markup-compatibility/2006">
-        <mc:Choice xmlns:a14="http://schemas.microsoft.com/office/drawing/2010/main" Requires="a14">
+      <mc:AlternateContent xmlns:mc="http://schemas.openxmlformats.org/markup-compatibility/2006" xmlns:a14="http://schemas.microsoft.com/office/drawing/2010/main">
+        <mc:Choice Requires="a14">
           <p:sp>
             <p:nvSpPr>
               <p:cNvPr id="12" name="Segnaposto contenuto 2">
@@ -11213,7 +11213,7 @@
             </p:txBody>
           </p:sp>
         </mc:Choice>
-        <mc:Fallback>
+        <mc:Fallback xmlns="">
           <p:sp>
             <p:nvSpPr>
               <p:cNvPr id="12" name="Segnaposto contenuto 2">
@@ -11258,8 +11258,8 @@
           </p:sp>
         </mc:Fallback>
       </mc:AlternateContent>
-      <mc:AlternateContent xmlns:mc="http://schemas.openxmlformats.org/markup-compatibility/2006">
-        <mc:Choice xmlns:a14="http://schemas.microsoft.com/office/drawing/2010/main" Requires="a14">
+      <mc:AlternateContent xmlns:mc="http://schemas.openxmlformats.org/markup-compatibility/2006" xmlns:a14="http://schemas.microsoft.com/office/drawing/2010/main">
+        <mc:Choice Requires="a14">
           <p:sp>
             <p:nvSpPr>
               <p:cNvPr id="16" name="CasellaDiTesto 15">
@@ -11440,7 +11440,7 @@
             </p:txBody>
           </p:sp>
         </mc:Choice>
-        <mc:Fallback>
+        <mc:Fallback xmlns="">
           <p:sp>
             <p:nvSpPr>
               <p:cNvPr id="16" name="CasellaDiTesto 15">
@@ -15417,7 +15417,7 @@
             <a:pPr algn="ctr"/>
             <a:r>
               <a:rPr lang="it-IT" sz="2200" dirty="0"/>
-              <a:t>L = 100 M</a:t>
+              <a:t>L = 100 m</a:t>
             </a:r>
           </a:p>
         </p:txBody>

</xml_diff>